<commit_message>
Todos los cuadros de operación
</commit_message>
<xml_diff>
--- a/Avance - Propuesta de Gemelo Digital.pptx
+++ b/Avance - Propuesta de Gemelo Digital.pptx
@@ -332,7 +332,7 @@
           <a:p>
             <a:fld id="{28F5EDAB-AF2A-44B1-845D-57FC9ACEA698}" type="datetimeFigureOut">
               <a:rPr lang="es-VE" smtClean="0"/>
-              <a:t>01/08/2019</a:t>
+              <a:t>29/09/2019</a:t>
             </a:fld>
             <a:endParaRPr lang="es-VE"/>
           </a:p>
@@ -502,7 +502,7 @@
           <a:p>
             <a:fld id="{28F5EDAB-AF2A-44B1-845D-57FC9ACEA698}" type="datetimeFigureOut">
               <a:rPr lang="es-VE" smtClean="0"/>
-              <a:t>01/08/2019</a:t>
+              <a:t>29/09/2019</a:t>
             </a:fld>
             <a:endParaRPr lang="es-VE"/>
           </a:p>
@@ -682,7 +682,7 @@
           <a:p>
             <a:fld id="{28F5EDAB-AF2A-44B1-845D-57FC9ACEA698}" type="datetimeFigureOut">
               <a:rPr lang="es-VE" smtClean="0"/>
-              <a:t>01/08/2019</a:t>
+              <a:t>29/09/2019</a:t>
             </a:fld>
             <a:endParaRPr lang="es-VE"/>
           </a:p>
@@ -932,7 +932,7 @@
             <a:fld id="{18FABF5F-F877-4D2E-B273-BECC1683601A}" type="datetimeFigureOut">
               <a:rPr lang="es-VE" smtClean="0"/>
               <a:pPr/>
-              <a:t>01/08/2019</a:t>
+              <a:t>29/09/2019</a:t>
             </a:fld>
             <a:endParaRPr lang="es-VE"/>
           </a:p>
@@ -1139,7 +1139,7 @@
             <a:fld id="{18FABF5F-F877-4D2E-B273-BECC1683601A}" type="datetimeFigureOut">
               <a:rPr lang="es-VE" smtClean="0"/>
               <a:pPr/>
-              <a:t>01/08/2019</a:t>
+              <a:t>29/09/2019</a:t>
             </a:fld>
             <a:endParaRPr lang="es-VE"/>
           </a:p>
@@ -1394,7 +1394,7 @@
             <a:fld id="{18FABF5F-F877-4D2E-B273-BECC1683601A}" type="datetimeFigureOut">
               <a:rPr lang="es-VE" smtClean="0"/>
               <a:pPr/>
-              <a:t>01/08/2019</a:t>
+              <a:t>29/09/2019</a:t>
             </a:fld>
             <a:endParaRPr lang="es-VE"/>
           </a:p>
@@ -1719,7 +1719,7 @@
             <a:fld id="{18FABF5F-F877-4D2E-B273-BECC1683601A}" type="datetimeFigureOut">
               <a:rPr lang="es-VE" smtClean="0"/>
               <a:pPr/>
-              <a:t>01/08/2019</a:t>
+              <a:t>29/09/2019</a:t>
             </a:fld>
             <a:endParaRPr lang="es-VE"/>
           </a:p>
@@ -2192,7 +2192,7 @@
             <a:fld id="{18FABF5F-F877-4D2E-B273-BECC1683601A}" type="datetimeFigureOut">
               <a:rPr lang="es-VE" smtClean="0"/>
               <a:pPr/>
-              <a:t>01/08/2019</a:t>
+              <a:t>29/09/2019</a:t>
             </a:fld>
             <a:endParaRPr lang="es-VE"/>
           </a:p>
@@ -2347,7 +2347,7 @@
             <a:fld id="{18FABF5F-F877-4D2E-B273-BECC1683601A}" type="datetimeFigureOut">
               <a:rPr lang="es-VE" smtClean="0"/>
               <a:pPr/>
-              <a:t>01/08/2019</a:t>
+              <a:t>29/09/2019</a:t>
             </a:fld>
             <a:endParaRPr lang="es-VE"/>
           </a:p>
@@ -2444,7 +2444,7 @@
             <a:fld id="{18FABF5F-F877-4D2E-B273-BECC1683601A}" type="datetimeFigureOut">
               <a:rPr lang="es-VE" smtClean="0"/>
               <a:pPr/>
-              <a:t>01/08/2019</a:t>
+              <a:t>29/09/2019</a:t>
             </a:fld>
             <a:endParaRPr lang="es-VE"/>
           </a:p>
@@ -2725,7 +2725,7 @@
             <a:fld id="{18FABF5F-F877-4D2E-B273-BECC1683601A}" type="datetimeFigureOut">
               <a:rPr lang="es-VE" smtClean="0"/>
               <a:pPr/>
-              <a:t>01/08/2019</a:t>
+              <a:t>29/09/2019</a:t>
             </a:fld>
             <a:endParaRPr lang="es-VE"/>
           </a:p>
@@ -2931,7 +2931,7 @@
           <a:p>
             <a:fld id="{28F5EDAB-AF2A-44B1-845D-57FC9ACEA698}" type="datetimeFigureOut">
               <a:rPr lang="es-VE" smtClean="0"/>
-              <a:t>01/08/2019</a:t>
+              <a:t>29/09/2019</a:t>
             </a:fld>
             <a:endParaRPr lang="es-VE"/>
           </a:p>
@@ -3207,7 +3207,7 @@
             <a:fld id="{18FABF5F-F877-4D2E-B273-BECC1683601A}" type="datetimeFigureOut">
               <a:rPr lang="es-VE" smtClean="0"/>
               <a:pPr/>
-              <a:t>01/08/2019</a:t>
+              <a:t>29/09/2019</a:t>
             </a:fld>
             <a:endParaRPr lang="es-VE"/>
           </a:p>
@@ -3379,7 +3379,7 @@
             <a:fld id="{18FABF5F-F877-4D2E-B273-BECC1683601A}" type="datetimeFigureOut">
               <a:rPr lang="es-VE" smtClean="0"/>
               <a:pPr/>
-              <a:t>01/08/2019</a:t>
+              <a:t>29/09/2019</a:t>
             </a:fld>
             <a:endParaRPr lang="es-VE"/>
           </a:p>
@@ -3561,7 +3561,7 @@
             <a:fld id="{18FABF5F-F877-4D2E-B273-BECC1683601A}" type="datetimeFigureOut">
               <a:rPr lang="es-VE" smtClean="0"/>
               <a:pPr/>
-              <a:t>01/08/2019</a:t>
+              <a:t>29/09/2019</a:t>
             </a:fld>
             <a:endParaRPr lang="es-VE"/>
           </a:p>
@@ -3808,7 +3808,7 @@
           <a:p>
             <a:fld id="{28F5EDAB-AF2A-44B1-845D-57FC9ACEA698}" type="datetimeFigureOut">
               <a:rPr lang="es-VE" smtClean="0"/>
-              <a:t>01/08/2019</a:t>
+              <a:t>29/09/2019</a:t>
             </a:fld>
             <a:endParaRPr lang="es-VE"/>
           </a:p>
@@ -4096,7 +4096,7 @@
           <a:p>
             <a:fld id="{28F5EDAB-AF2A-44B1-845D-57FC9ACEA698}" type="datetimeFigureOut">
               <a:rPr lang="es-VE" smtClean="0"/>
-              <a:t>01/08/2019</a:t>
+              <a:t>29/09/2019</a:t>
             </a:fld>
             <a:endParaRPr lang="es-VE"/>
           </a:p>
@@ -4518,7 +4518,7 @@
           <a:p>
             <a:fld id="{28F5EDAB-AF2A-44B1-845D-57FC9ACEA698}" type="datetimeFigureOut">
               <a:rPr lang="es-VE" smtClean="0"/>
-              <a:t>01/08/2019</a:t>
+              <a:t>29/09/2019</a:t>
             </a:fld>
             <a:endParaRPr lang="es-VE"/>
           </a:p>
@@ -4636,7 +4636,7 @@
           <a:p>
             <a:fld id="{28F5EDAB-AF2A-44B1-845D-57FC9ACEA698}" type="datetimeFigureOut">
               <a:rPr lang="es-VE" smtClean="0"/>
-              <a:t>01/08/2019</a:t>
+              <a:t>29/09/2019</a:t>
             </a:fld>
             <a:endParaRPr lang="es-VE"/>
           </a:p>
@@ -4731,7 +4731,7 @@
           <a:p>
             <a:fld id="{28F5EDAB-AF2A-44B1-845D-57FC9ACEA698}" type="datetimeFigureOut">
               <a:rPr lang="es-VE" smtClean="0"/>
-              <a:t>01/08/2019</a:t>
+              <a:t>29/09/2019</a:t>
             </a:fld>
             <a:endParaRPr lang="es-VE"/>
           </a:p>
@@ -5008,7 +5008,7 @@
           <a:p>
             <a:fld id="{28F5EDAB-AF2A-44B1-845D-57FC9ACEA698}" type="datetimeFigureOut">
               <a:rPr lang="es-VE" smtClean="0"/>
-              <a:t>01/08/2019</a:t>
+              <a:t>29/09/2019</a:t>
             </a:fld>
             <a:endParaRPr lang="es-VE"/>
           </a:p>
@@ -5261,7 +5261,7 @@
           <a:p>
             <a:fld id="{28F5EDAB-AF2A-44B1-845D-57FC9ACEA698}" type="datetimeFigureOut">
               <a:rPr lang="es-VE" smtClean="0"/>
-              <a:t>01/08/2019</a:t>
+              <a:t>29/09/2019</a:t>
             </a:fld>
             <a:endParaRPr lang="es-VE"/>
           </a:p>
@@ -5474,7 +5474,7 @@
           <a:p>
             <a:fld id="{28F5EDAB-AF2A-44B1-845D-57FC9ACEA698}" type="datetimeFigureOut">
               <a:rPr lang="es-VE" smtClean="0"/>
-              <a:t>01/08/2019</a:t>
+              <a:t>29/09/2019</a:t>
             </a:fld>
             <a:endParaRPr lang="es-VE"/>
           </a:p>
@@ -6083,7 +6083,7 @@
             <a:fld id="{18FABF5F-F877-4D2E-B273-BECC1683601A}" type="datetimeFigureOut">
               <a:rPr lang="es-VE" smtClean="0"/>
               <a:pPr/>
-              <a:t>01/08/2019</a:t>
+              <a:t>29/09/2019</a:t>
             </a:fld>
             <a:endParaRPr lang="es-VE"/>
           </a:p>
@@ -8950,7 +8950,7 @@
           <p:cNvPr id="7" name="Grupo 3">
             <a:extLst>
               <a:ext uri="{FF2B5EF4-FFF2-40B4-BE49-F238E27FC236}">
-                <a16:creationId xmlns="" xmlns:a16="http://schemas.microsoft.com/office/drawing/2014/main" id="{8C7C204D-11EF-45D0-8867-A00C5BD49091}"/>
+                <a16:creationId xmlns:a16="http://schemas.microsoft.com/office/drawing/2014/main" xmlns="" id="{8C7C204D-11EF-45D0-8867-A00C5BD49091}"/>
               </a:ext>
             </a:extLst>
           </p:cNvPr>
@@ -8970,7 +8970,7 @@
             <p:cNvPr id="8" name="Grupo 4">
               <a:extLst>
                 <a:ext uri="{FF2B5EF4-FFF2-40B4-BE49-F238E27FC236}">
-                  <a16:creationId xmlns="" xmlns:a16="http://schemas.microsoft.com/office/drawing/2014/main" id="{7D5AD5FE-599F-422D-A962-C17D80869E46}"/>
+                  <a16:creationId xmlns:a16="http://schemas.microsoft.com/office/drawing/2014/main" xmlns="" id="{7D5AD5FE-599F-422D-A962-C17D80869E46}"/>
                 </a:ext>
               </a:extLst>
             </p:cNvPr>
@@ -8990,7 +8990,7 @@
               <p:cNvPr id="108" name="Grupo 104">
                 <a:extLst>
                   <a:ext uri="{FF2B5EF4-FFF2-40B4-BE49-F238E27FC236}">
-                    <a16:creationId xmlns="" xmlns:a16="http://schemas.microsoft.com/office/drawing/2014/main" id="{BB59B893-BDE1-4825-A8C0-25A09768DEA6}"/>
+                    <a16:creationId xmlns:a16="http://schemas.microsoft.com/office/drawing/2014/main" xmlns="" id="{BB59B893-BDE1-4825-A8C0-25A09768DEA6}"/>
                   </a:ext>
                 </a:extLst>
               </p:cNvPr>
@@ -9010,7 +9010,7 @@
                 <p:cNvPr id="133" name="Freeform 8">
                   <a:extLst>
                     <a:ext uri="{FF2B5EF4-FFF2-40B4-BE49-F238E27FC236}">
-                      <a16:creationId xmlns="" xmlns:a16="http://schemas.microsoft.com/office/drawing/2014/main" id="{DA0534E3-7442-440A-8306-8941857E1B50}"/>
+                      <a16:creationId xmlns:a16="http://schemas.microsoft.com/office/drawing/2014/main" xmlns="" id="{DA0534E3-7442-440A-8306-8941857E1B50}"/>
                     </a:ext>
                   </a:extLst>
                 </p:cNvPr>
@@ -9118,7 +9118,7 @@
                 <p:cNvPr id="134" name="Freeform 6">
                   <a:extLst>
                     <a:ext uri="{FF2B5EF4-FFF2-40B4-BE49-F238E27FC236}">
-                      <a16:creationId xmlns="" xmlns:a16="http://schemas.microsoft.com/office/drawing/2014/main" id="{844A92B5-145D-4B44-BFEA-0A7298855C2B}"/>
+                      <a16:creationId xmlns:a16="http://schemas.microsoft.com/office/drawing/2014/main" xmlns="" id="{844A92B5-145D-4B44-BFEA-0A7298855C2B}"/>
                     </a:ext>
                   </a:extLst>
                 </p:cNvPr>
@@ -9218,7 +9218,7 @@
                 <p:cNvPr id="135" name="Freeform 7">
                   <a:extLst>
                     <a:ext uri="{FF2B5EF4-FFF2-40B4-BE49-F238E27FC236}">
-                      <a16:creationId xmlns="" xmlns:a16="http://schemas.microsoft.com/office/drawing/2014/main" id="{434CAE01-83E5-4320-BDF0-D2D7144C0A5A}"/>
+                      <a16:creationId xmlns:a16="http://schemas.microsoft.com/office/drawing/2014/main" xmlns="" id="{434CAE01-83E5-4320-BDF0-D2D7144C0A5A}"/>
                     </a:ext>
                   </a:extLst>
                 </p:cNvPr>
@@ -9318,7 +9318,7 @@
                 <p:cNvPr id="136" name="Text Box 9">
                   <a:extLst>
                     <a:ext uri="{FF2B5EF4-FFF2-40B4-BE49-F238E27FC236}">
-                      <a16:creationId xmlns="" xmlns:a16="http://schemas.microsoft.com/office/drawing/2014/main" id="{543BBCE9-BA45-468D-9117-9B5EF64D32C3}"/>
+                      <a16:creationId xmlns:a16="http://schemas.microsoft.com/office/drawing/2014/main" xmlns="" id="{543BBCE9-BA45-468D-9117-9B5EF64D32C3}"/>
                     </a:ext>
                   </a:extLst>
                 </p:cNvPr>
@@ -9398,7 +9398,7 @@
               <p:cNvPr id="109" name="Grupo 105">
                 <a:extLst>
                   <a:ext uri="{FF2B5EF4-FFF2-40B4-BE49-F238E27FC236}">
-                    <a16:creationId xmlns="" xmlns:a16="http://schemas.microsoft.com/office/drawing/2014/main" id="{ECE4D379-1F6B-4D24-9105-8F8CF1CE8EC1}"/>
+                    <a16:creationId xmlns:a16="http://schemas.microsoft.com/office/drawing/2014/main" xmlns="" id="{ECE4D379-1F6B-4D24-9105-8F8CF1CE8EC1}"/>
                   </a:ext>
                 </a:extLst>
               </p:cNvPr>
@@ -9418,7 +9418,7 @@
                 <p:cNvPr id="128" name="Grupo 124">
                   <a:extLst>
                     <a:ext uri="{FF2B5EF4-FFF2-40B4-BE49-F238E27FC236}">
-                      <a16:creationId xmlns="" xmlns:a16="http://schemas.microsoft.com/office/drawing/2014/main" id="{B2C7C956-B834-4E98-A247-D777FED8F01C}"/>
+                      <a16:creationId xmlns:a16="http://schemas.microsoft.com/office/drawing/2014/main" xmlns="" id="{B2C7C956-B834-4E98-A247-D777FED8F01C}"/>
                     </a:ext>
                   </a:extLst>
                 </p:cNvPr>
@@ -9438,7 +9438,7 @@
                   <p:cNvPr id="130" name="Freeform 10">
                     <a:extLst>
                       <a:ext uri="{FF2B5EF4-FFF2-40B4-BE49-F238E27FC236}">
-                        <a16:creationId xmlns="" xmlns:a16="http://schemas.microsoft.com/office/drawing/2014/main" id="{10B01C71-55B4-49D9-8935-247DED630A8A}"/>
+                        <a16:creationId xmlns:a16="http://schemas.microsoft.com/office/drawing/2014/main" xmlns="" id="{10B01C71-55B4-49D9-8935-247DED630A8A}"/>
                       </a:ext>
                     </a:extLst>
                   </p:cNvPr>
@@ -9538,7 +9538,7 @@
                   <p:cNvPr id="131" name="Freeform 11">
                     <a:extLst>
                       <a:ext uri="{FF2B5EF4-FFF2-40B4-BE49-F238E27FC236}">
-                        <a16:creationId xmlns="" xmlns:a16="http://schemas.microsoft.com/office/drawing/2014/main" id="{61E5DE99-3768-49FE-950E-E0C294B3CC93}"/>
+                        <a16:creationId xmlns:a16="http://schemas.microsoft.com/office/drawing/2014/main" xmlns="" id="{61E5DE99-3768-49FE-950E-E0C294B3CC93}"/>
                       </a:ext>
                     </a:extLst>
                   </p:cNvPr>
@@ -9638,7 +9638,7 @@
                   <p:cNvPr id="132" name="Freeform 12">
                     <a:extLst>
                       <a:ext uri="{FF2B5EF4-FFF2-40B4-BE49-F238E27FC236}">
-                        <a16:creationId xmlns="" xmlns:a16="http://schemas.microsoft.com/office/drawing/2014/main" id="{41656965-12EF-472B-A4EA-752ABE4F07FB}"/>
+                        <a16:creationId xmlns:a16="http://schemas.microsoft.com/office/drawing/2014/main" xmlns="" id="{41656965-12EF-472B-A4EA-752ABE4F07FB}"/>
                       </a:ext>
                     </a:extLst>
                   </p:cNvPr>
@@ -9755,7 +9755,7 @@
                 <p:cNvPr id="129" name="Text Box 13">
                   <a:extLst>
                     <a:ext uri="{FF2B5EF4-FFF2-40B4-BE49-F238E27FC236}">
-                      <a16:creationId xmlns="" xmlns:a16="http://schemas.microsoft.com/office/drawing/2014/main" id="{037C8D55-5A21-458C-A051-59F1D4B6DD4A}"/>
+                      <a16:creationId xmlns:a16="http://schemas.microsoft.com/office/drawing/2014/main" xmlns="" id="{037C8D55-5A21-458C-A051-59F1D4B6DD4A}"/>
                     </a:ext>
                   </a:extLst>
                 </p:cNvPr>
@@ -9834,7 +9834,7 @@
               <p:cNvPr id="110" name="Grupo 106">
                 <a:extLst>
                   <a:ext uri="{FF2B5EF4-FFF2-40B4-BE49-F238E27FC236}">
-                    <a16:creationId xmlns="" xmlns:a16="http://schemas.microsoft.com/office/drawing/2014/main" id="{5CAA0DBC-3EA1-4B93-9EB2-92C29CB9E6FA}"/>
+                    <a16:creationId xmlns:a16="http://schemas.microsoft.com/office/drawing/2014/main" xmlns="" id="{5CAA0DBC-3EA1-4B93-9EB2-92C29CB9E6FA}"/>
                   </a:ext>
                 </a:extLst>
               </p:cNvPr>
@@ -9854,7 +9854,7 @@
                 <p:cNvPr id="123" name="Grupo 119">
                   <a:extLst>
                     <a:ext uri="{FF2B5EF4-FFF2-40B4-BE49-F238E27FC236}">
-                      <a16:creationId xmlns="" xmlns:a16="http://schemas.microsoft.com/office/drawing/2014/main" id="{39E760FD-1DAD-49B2-B504-75CEF08B8BA3}"/>
+                      <a16:creationId xmlns:a16="http://schemas.microsoft.com/office/drawing/2014/main" xmlns="" id="{39E760FD-1DAD-49B2-B504-75CEF08B8BA3}"/>
                     </a:ext>
                   </a:extLst>
                 </p:cNvPr>
@@ -9874,7 +9874,7 @@
                   <p:cNvPr id="125" name="Freeform 10">
                     <a:extLst>
                       <a:ext uri="{FF2B5EF4-FFF2-40B4-BE49-F238E27FC236}">
-                        <a16:creationId xmlns="" xmlns:a16="http://schemas.microsoft.com/office/drawing/2014/main" id="{D5B3E2F8-7104-471B-8D37-ED575F1BDEEB}"/>
+                        <a16:creationId xmlns:a16="http://schemas.microsoft.com/office/drawing/2014/main" xmlns="" id="{D5B3E2F8-7104-471B-8D37-ED575F1BDEEB}"/>
                       </a:ext>
                     </a:extLst>
                   </p:cNvPr>
@@ -9974,7 +9974,7 @@
                   <p:cNvPr id="126" name="Freeform 11">
                     <a:extLst>
                       <a:ext uri="{FF2B5EF4-FFF2-40B4-BE49-F238E27FC236}">
-                        <a16:creationId xmlns="" xmlns:a16="http://schemas.microsoft.com/office/drawing/2014/main" id="{02F5ED86-8117-4D33-8E4A-39B334AB7D0D}"/>
+                        <a16:creationId xmlns:a16="http://schemas.microsoft.com/office/drawing/2014/main" xmlns="" id="{02F5ED86-8117-4D33-8E4A-39B334AB7D0D}"/>
                       </a:ext>
                     </a:extLst>
                   </p:cNvPr>
@@ -10074,7 +10074,7 @@
                   <p:cNvPr id="127" name="Freeform 12">
                     <a:extLst>
                       <a:ext uri="{FF2B5EF4-FFF2-40B4-BE49-F238E27FC236}">
-                        <a16:creationId xmlns="" xmlns:a16="http://schemas.microsoft.com/office/drawing/2014/main" id="{18F43B56-CC38-491A-A9E8-A33B509D3EBB}"/>
+                        <a16:creationId xmlns:a16="http://schemas.microsoft.com/office/drawing/2014/main" xmlns="" id="{18F43B56-CC38-491A-A9E8-A33B509D3EBB}"/>
                       </a:ext>
                     </a:extLst>
                   </p:cNvPr>
@@ -10191,7 +10191,7 @@
                 <p:cNvPr id="124" name="Text Box 13">
                   <a:extLst>
                     <a:ext uri="{FF2B5EF4-FFF2-40B4-BE49-F238E27FC236}">
-                      <a16:creationId xmlns="" xmlns:a16="http://schemas.microsoft.com/office/drawing/2014/main" id="{DFDF79D7-CD3A-4616-8EB6-C1E8B758CE5E}"/>
+                      <a16:creationId xmlns:a16="http://schemas.microsoft.com/office/drawing/2014/main" xmlns="" id="{DFDF79D7-CD3A-4616-8EB6-C1E8B758CE5E}"/>
                     </a:ext>
                   </a:extLst>
                 </p:cNvPr>
@@ -10270,7 +10270,7 @@
               <p:cNvPr id="111" name="Grupo 107">
                 <a:extLst>
                   <a:ext uri="{FF2B5EF4-FFF2-40B4-BE49-F238E27FC236}">
-                    <a16:creationId xmlns="" xmlns:a16="http://schemas.microsoft.com/office/drawing/2014/main" id="{CF91C809-0817-46D6-9D5A-041B55F74482}"/>
+                    <a16:creationId xmlns:a16="http://schemas.microsoft.com/office/drawing/2014/main" xmlns="" id="{CF91C809-0817-46D6-9D5A-041B55F74482}"/>
                   </a:ext>
                 </a:extLst>
               </p:cNvPr>
@@ -10290,7 +10290,7 @@
                 <p:cNvPr id="118" name="Grupo 114">
                   <a:extLst>
                     <a:ext uri="{FF2B5EF4-FFF2-40B4-BE49-F238E27FC236}">
-                      <a16:creationId xmlns="" xmlns:a16="http://schemas.microsoft.com/office/drawing/2014/main" id="{78E867A0-7ABD-4E98-9C16-B3AAB3FE5BD3}"/>
+                      <a16:creationId xmlns:a16="http://schemas.microsoft.com/office/drawing/2014/main" xmlns="" id="{78E867A0-7ABD-4E98-9C16-B3AAB3FE5BD3}"/>
                     </a:ext>
                   </a:extLst>
                 </p:cNvPr>
@@ -10310,7 +10310,7 @@
                   <p:cNvPr id="120" name="Freeform 10">
                     <a:extLst>
                       <a:ext uri="{FF2B5EF4-FFF2-40B4-BE49-F238E27FC236}">
-                        <a16:creationId xmlns="" xmlns:a16="http://schemas.microsoft.com/office/drawing/2014/main" id="{74A308C1-3A08-4382-8F91-1A18B7C077CB}"/>
+                        <a16:creationId xmlns:a16="http://schemas.microsoft.com/office/drawing/2014/main" xmlns="" id="{74A308C1-3A08-4382-8F91-1A18B7C077CB}"/>
                       </a:ext>
                     </a:extLst>
                   </p:cNvPr>
@@ -10410,7 +10410,7 @@
                   <p:cNvPr id="121" name="Freeform 11">
                     <a:extLst>
                       <a:ext uri="{FF2B5EF4-FFF2-40B4-BE49-F238E27FC236}">
-                        <a16:creationId xmlns="" xmlns:a16="http://schemas.microsoft.com/office/drawing/2014/main" id="{0372E6FB-0AAA-4077-A7B9-629C821755D1}"/>
+                        <a16:creationId xmlns:a16="http://schemas.microsoft.com/office/drawing/2014/main" xmlns="" id="{0372E6FB-0AAA-4077-A7B9-629C821755D1}"/>
                       </a:ext>
                     </a:extLst>
                   </p:cNvPr>
@@ -10510,7 +10510,7 @@
                   <p:cNvPr id="122" name="Freeform 12">
                     <a:extLst>
                       <a:ext uri="{FF2B5EF4-FFF2-40B4-BE49-F238E27FC236}">
-                        <a16:creationId xmlns="" xmlns:a16="http://schemas.microsoft.com/office/drawing/2014/main" id="{0BA4862C-EC8B-45F3-8207-9BDB0E478850}"/>
+                        <a16:creationId xmlns:a16="http://schemas.microsoft.com/office/drawing/2014/main" xmlns="" id="{0BA4862C-EC8B-45F3-8207-9BDB0E478850}"/>
                       </a:ext>
                     </a:extLst>
                   </p:cNvPr>
@@ -10627,7 +10627,7 @@
                 <p:cNvPr id="119" name="Text Box 13">
                   <a:extLst>
                     <a:ext uri="{FF2B5EF4-FFF2-40B4-BE49-F238E27FC236}">
-                      <a16:creationId xmlns="" xmlns:a16="http://schemas.microsoft.com/office/drawing/2014/main" id="{07535DA1-E550-411A-9CCF-A560734D301F}"/>
+                      <a16:creationId xmlns:a16="http://schemas.microsoft.com/office/drawing/2014/main" xmlns="" id="{07535DA1-E550-411A-9CCF-A560734D301F}"/>
                     </a:ext>
                   </a:extLst>
                 </p:cNvPr>
@@ -10706,7 +10706,7 @@
               <p:cNvPr id="112" name="Grupo 108">
                 <a:extLst>
                   <a:ext uri="{FF2B5EF4-FFF2-40B4-BE49-F238E27FC236}">
-                    <a16:creationId xmlns="" xmlns:a16="http://schemas.microsoft.com/office/drawing/2014/main" id="{FD2FBFAC-A021-4B2D-9A89-74ED30D310E9}"/>
+                    <a16:creationId xmlns:a16="http://schemas.microsoft.com/office/drawing/2014/main" xmlns="" id="{FD2FBFAC-A021-4B2D-9A89-74ED30D310E9}"/>
                   </a:ext>
                 </a:extLst>
               </p:cNvPr>
@@ -10726,7 +10726,7 @@
                 <p:cNvPr id="113" name="Grupo 109">
                   <a:extLst>
                     <a:ext uri="{FF2B5EF4-FFF2-40B4-BE49-F238E27FC236}">
-                      <a16:creationId xmlns="" xmlns:a16="http://schemas.microsoft.com/office/drawing/2014/main" id="{29ED0EFB-2730-48E5-B1C7-81B6900A250A}"/>
+                      <a16:creationId xmlns:a16="http://schemas.microsoft.com/office/drawing/2014/main" xmlns="" id="{29ED0EFB-2730-48E5-B1C7-81B6900A250A}"/>
                     </a:ext>
                   </a:extLst>
                 </p:cNvPr>
@@ -10746,7 +10746,7 @@
                   <p:cNvPr id="115" name="Freeform 10">
                     <a:extLst>
                       <a:ext uri="{FF2B5EF4-FFF2-40B4-BE49-F238E27FC236}">
-                        <a16:creationId xmlns="" xmlns:a16="http://schemas.microsoft.com/office/drawing/2014/main" id="{8E4432E7-45A3-4D2C-938E-1C46C2C5CD71}"/>
+                        <a16:creationId xmlns:a16="http://schemas.microsoft.com/office/drawing/2014/main" xmlns="" id="{8E4432E7-45A3-4D2C-938E-1C46C2C5CD71}"/>
                       </a:ext>
                     </a:extLst>
                   </p:cNvPr>
@@ -10846,7 +10846,7 @@
                   <p:cNvPr id="116" name="Freeform 11">
                     <a:extLst>
                       <a:ext uri="{FF2B5EF4-FFF2-40B4-BE49-F238E27FC236}">
-                        <a16:creationId xmlns="" xmlns:a16="http://schemas.microsoft.com/office/drawing/2014/main" id="{A36F2312-FFE5-46C0-9131-E73BD196F57D}"/>
+                        <a16:creationId xmlns:a16="http://schemas.microsoft.com/office/drawing/2014/main" xmlns="" id="{A36F2312-FFE5-46C0-9131-E73BD196F57D}"/>
                       </a:ext>
                     </a:extLst>
                   </p:cNvPr>
@@ -10946,7 +10946,7 @@
                   <p:cNvPr id="117" name="Freeform 12">
                     <a:extLst>
                       <a:ext uri="{FF2B5EF4-FFF2-40B4-BE49-F238E27FC236}">
-                        <a16:creationId xmlns="" xmlns:a16="http://schemas.microsoft.com/office/drawing/2014/main" id="{39BAF9C7-F4DB-4C00-94E2-98E60F05781B}"/>
+                        <a16:creationId xmlns:a16="http://schemas.microsoft.com/office/drawing/2014/main" xmlns="" id="{39BAF9C7-F4DB-4C00-94E2-98E60F05781B}"/>
                       </a:ext>
                     </a:extLst>
                   </p:cNvPr>
@@ -11063,7 +11063,7 @@
                 <p:cNvPr id="114" name="Text Box 13">
                   <a:extLst>
                     <a:ext uri="{FF2B5EF4-FFF2-40B4-BE49-F238E27FC236}">
-                      <a16:creationId xmlns="" xmlns:a16="http://schemas.microsoft.com/office/drawing/2014/main" id="{8A06546A-08C9-4681-8FA2-0F3EB940B683}"/>
+                      <a16:creationId xmlns:a16="http://schemas.microsoft.com/office/drawing/2014/main" xmlns="" id="{8A06546A-08C9-4681-8FA2-0F3EB940B683}"/>
                     </a:ext>
                   </a:extLst>
                 </p:cNvPr>
@@ -11143,7 +11143,7 @@
             <p:cNvPr id="9" name="Picture 2" descr="Resultado de imagen para foto embalse">
               <a:extLst>
                 <a:ext uri="{FF2B5EF4-FFF2-40B4-BE49-F238E27FC236}">
-                  <a16:creationId xmlns="" xmlns:a16="http://schemas.microsoft.com/office/drawing/2014/main" id="{70D73F86-0334-4A05-8843-9ECD5CF95B24}"/>
+                  <a16:creationId xmlns:a16="http://schemas.microsoft.com/office/drawing/2014/main" xmlns="" id="{70D73F86-0334-4A05-8843-9ECD5CF95B24}"/>
                 </a:ext>
               </a:extLst>
             </p:cNvPr>
@@ -11190,7 +11190,7 @@
             <p:cNvPr id="10" name="Picture 4" descr="http://www.planoinformativo.com/stock11/image/2014/Agosto/16/obrasagua.jpg">
               <a:extLst>
                 <a:ext uri="{FF2B5EF4-FFF2-40B4-BE49-F238E27FC236}">
-                  <a16:creationId xmlns="" xmlns:a16="http://schemas.microsoft.com/office/drawing/2014/main" id="{B3B6D3B2-1889-4885-A00F-16FBDF25DD2D}"/>
+                  <a16:creationId xmlns:a16="http://schemas.microsoft.com/office/drawing/2014/main" xmlns="" id="{B3B6D3B2-1889-4885-A00F-16FBDF25DD2D}"/>
                 </a:ext>
               </a:extLst>
             </p:cNvPr>
@@ -11235,7 +11235,7 @@
             <p:cNvPr id="11" name="Picture 6" descr="Imagen relacionada">
               <a:extLst>
                 <a:ext uri="{FF2B5EF4-FFF2-40B4-BE49-F238E27FC236}">
-                  <a16:creationId xmlns="" xmlns:a16="http://schemas.microsoft.com/office/drawing/2014/main" id="{419F96CD-1457-4B25-AE33-90E40D97806A}"/>
+                  <a16:creationId xmlns:a16="http://schemas.microsoft.com/office/drawing/2014/main" xmlns="" id="{419F96CD-1457-4B25-AE33-90E40D97806A}"/>
                 </a:ext>
               </a:extLst>
             </p:cNvPr>
@@ -11282,7 +11282,7 @@
             <p:cNvPr id="12" name="Picture 8" descr="Resultado de imagen para rio tocuyo">
               <a:extLst>
                 <a:ext uri="{FF2B5EF4-FFF2-40B4-BE49-F238E27FC236}">
-                  <a16:creationId xmlns="" xmlns:a16="http://schemas.microsoft.com/office/drawing/2014/main" id="{574FD85C-11DE-4B87-9777-1645C7D9B34B}"/>
+                  <a16:creationId xmlns:a16="http://schemas.microsoft.com/office/drawing/2014/main" xmlns="" id="{574FD85C-11DE-4B87-9777-1645C7D9B34B}"/>
                 </a:ext>
               </a:extLst>
             </p:cNvPr>
@@ -11329,7 +11329,7 @@
             <p:cNvPr id="13" name="Picture 10" descr="Resultado de imagen para tuberias de distribuciÃ³n de agua potable">
               <a:extLst>
                 <a:ext uri="{FF2B5EF4-FFF2-40B4-BE49-F238E27FC236}">
-                  <a16:creationId xmlns="" xmlns:a16="http://schemas.microsoft.com/office/drawing/2014/main" id="{F225CB27-EAC8-4D07-9443-2E23765745AF}"/>
+                  <a16:creationId xmlns:a16="http://schemas.microsoft.com/office/drawing/2014/main" xmlns="" id="{F225CB27-EAC8-4D07-9443-2E23765745AF}"/>
                 </a:ext>
               </a:extLst>
             </p:cNvPr>
@@ -11376,7 +11376,7 @@
             <p:cNvPr id="14" name="Picture 12" descr="Imagen relacionada">
               <a:extLst>
                 <a:ext uri="{FF2B5EF4-FFF2-40B4-BE49-F238E27FC236}">
-                  <a16:creationId xmlns="" xmlns:a16="http://schemas.microsoft.com/office/drawing/2014/main" id="{4C8CB310-94D9-4521-B03E-979B77B30A46}"/>
+                  <a16:creationId xmlns:a16="http://schemas.microsoft.com/office/drawing/2014/main" xmlns="" id="{4C8CB310-94D9-4521-B03E-979B77B30A46}"/>
                 </a:ext>
               </a:extLst>
             </p:cNvPr>
@@ -11423,7 +11423,7 @@
             <p:cNvPr id="15" name="Picture 14" descr="Resultado de imagen para plantas potabilizadoras">
               <a:extLst>
                 <a:ext uri="{FF2B5EF4-FFF2-40B4-BE49-F238E27FC236}">
-                  <a16:creationId xmlns="" xmlns:a16="http://schemas.microsoft.com/office/drawing/2014/main" id="{1EA41D3A-A4D8-4062-978C-DC37DA884F8A}"/>
+                  <a16:creationId xmlns:a16="http://schemas.microsoft.com/office/drawing/2014/main" xmlns="" id="{1EA41D3A-A4D8-4062-978C-DC37DA884F8A}"/>
                 </a:ext>
               </a:extLst>
             </p:cNvPr>
@@ -11470,7 +11470,7 @@
             <p:cNvPr id="16" name="Picture 16" descr="Resultado de imagen para plantas potabilizadoras">
               <a:extLst>
                 <a:ext uri="{FF2B5EF4-FFF2-40B4-BE49-F238E27FC236}">
-                  <a16:creationId xmlns="" xmlns:a16="http://schemas.microsoft.com/office/drawing/2014/main" id="{A58A7A5E-5FB1-440F-95A4-173259DC21EE}"/>
+                  <a16:creationId xmlns:a16="http://schemas.microsoft.com/office/drawing/2014/main" xmlns="" id="{A58A7A5E-5FB1-440F-95A4-173259DC21EE}"/>
                 </a:ext>
               </a:extLst>
             </p:cNvPr>
@@ -11515,7 +11515,7 @@
             <p:cNvPr id="17" name="Picture 18" descr="Resultado de imagen para tanques de distribuciÃ³n agua potable">
               <a:extLst>
                 <a:ext uri="{FF2B5EF4-FFF2-40B4-BE49-F238E27FC236}">
-                  <a16:creationId xmlns="" xmlns:a16="http://schemas.microsoft.com/office/drawing/2014/main" id="{AC3BAFD3-7CCC-4C33-9019-523B7229D827}"/>
+                  <a16:creationId xmlns:a16="http://schemas.microsoft.com/office/drawing/2014/main" xmlns="" id="{AC3BAFD3-7CCC-4C33-9019-523B7229D827}"/>
                 </a:ext>
               </a:extLst>
             </p:cNvPr>
@@ -11562,7 +11562,7 @@
             <p:cNvPr id="18" name="Picture 20" descr="Imagen relacionada">
               <a:extLst>
                 <a:ext uri="{FF2B5EF4-FFF2-40B4-BE49-F238E27FC236}">
-                  <a16:creationId xmlns="" xmlns:a16="http://schemas.microsoft.com/office/drawing/2014/main" id="{E25B1F8C-44C7-49E5-B898-E6ED29E847DB}"/>
+                  <a16:creationId xmlns:a16="http://schemas.microsoft.com/office/drawing/2014/main" xmlns="" id="{E25B1F8C-44C7-49E5-B898-E6ED29E847DB}"/>
                 </a:ext>
               </a:extLst>
             </p:cNvPr>
@@ -11607,7 +11607,7 @@
             <p:cNvPr id="19" name="Grupo 15">
               <a:extLst>
                 <a:ext uri="{FF2B5EF4-FFF2-40B4-BE49-F238E27FC236}">
-                  <a16:creationId xmlns="" xmlns:a16="http://schemas.microsoft.com/office/drawing/2014/main" id="{01446251-32B1-4AD9-A575-F172D6991084}"/>
+                  <a16:creationId xmlns:a16="http://schemas.microsoft.com/office/drawing/2014/main" xmlns="" id="{01446251-32B1-4AD9-A575-F172D6991084}"/>
                 </a:ext>
               </a:extLst>
             </p:cNvPr>
@@ -11627,7 +11627,7 @@
               <p:cNvPr id="103" name="Cubo 99">
                 <a:extLst>
                   <a:ext uri="{FF2B5EF4-FFF2-40B4-BE49-F238E27FC236}">
-                    <a16:creationId xmlns="" xmlns:a16="http://schemas.microsoft.com/office/drawing/2014/main" id="{4D24D72E-0AD5-47A4-B535-12FD29296169}"/>
+                    <a16:creationId xmlns:a16="http://schemas.microsoft.com/office/drawing/2014/main" xmlns="" id="{4D24D72E-0AD5-47A4-B535-12FD29296169}"/>
                   </a:ext>
                 </a:extLst>
               </p:cNvPr>
@@ -11680,7 +11680,7 @@
               <p:cNvPr id="104" name="Conector recto 100">
                 <a:extLst>
                   <a:ext uri="{FF2B5EF4-FFF2-40B4-BE49-F238E27FC236}">
-                    <a16:creationId xmlns="" xmlns:a16="http://schemas.microsoft.com/office/drawing/2014/main" id="{6E543E18-E690-46FF-82C7-95BF73E56D1A}"/>
+                    <a16:creationId xmlns:a16="http://schemas.microsoft.com/office/drawing/2014/main" xmlns="" id="{6E543E18-E690-46FF-82C7-95BF73E56D1A}"/>
                   </a:ext>
                 </a:extLst>
               </p:cNvPr>
@@ -11717,7 +11717,7 @@
               <p:cNvPr id="105" name="Conector recto 101">
                 <a:extLst>
                   <a:ext uri="{FF2B5EF4-FFF2-40B4-BE49-F238E27FC236}">
-                    <a16:creationId xmlns="" xmlns:a16="http://schemas.microsoft.com/office/drawing/2014/main" id="{A37C3607-EA72-4238-BFFE-6E3362B043F6}"/>
+                    <a16:creationId xmlns:a16="http://schemas.microsoft.com/office/drawing/2014/main" xmlns="" id="{A37C3607-EA72-4238-BFFE-6E3362B043F6}"/>
                   </a:ext>
                 </a:extLst>
               </p:cNvPr>
@@ -11754,7 +11754,7 @@
               <p:cNvPr id="106" name="Conector recto 102">
                 <a:extLst>
                   <a:ext uri="{FF2B5EF4-FFF2-40B4-BE49-F238E27FC236}">
-                    <a16:creationId xmlns="" xmlns:a16="http://schemas.microsoft.com/office/drawing/2014/main" id="{EA75B98C-2598-428B-B460-1445A0D916BB}"/>
+                    <a16:creationId xmlns:a16="http://schemas.microsoft.com/office/drawing/2014/main" xmlns="" id="{EA75B98C-2598-428B-B460-1445A0D916BB}"/>
                   </a:ext>
                 </a:extLst>
               </p:cNvPr>
@@ -11793,7 +11793,7 @@
               <p:cNvPr id="107" name="Conector recto 103">
                 <a:extLst>
                   <a:ext uri="{FF2B5EF4-FFF2-40B4-BE49-F238E27FC236}">
-                    <a16:creationId xmlns="" xmlns:a16="http://schemas.microsoft.com/office/drawing/2014/main" id="{B60D510E-C5F0-4C1F-8577-89697F0DA415}"/>
+                    <a16:creationId xmlns:a16="http://schemas.microsoft.com/office/drawing/2014/main" xmlns="" id="{B60D510E-C5F0-4C1F-8577-89697F0DA415}"/>
                   </a:ext>
                 </a:extLst>
               </p:cNvPr>
@@ -11833,7 +11833,7 @@
             <p:cNvPr id="20" name="Grupo 16">
               <a:extLst>
                 <a:ext uri="{FF2B5EF4-FFF2-40B4-BE49-F238E27FC236}">
-                  <a16:creationId xmlns="" xmlns:a16="http://schemas.microsoft.com/office/drawing/2014/main" id="{13AF4FC9-50F3-4305-B524-E02EFBA959D6}"/>
+                  <a16:creationId xmlns:a16="http://schemas.microsoft.com/office/drawing/2014/main" xmlns="" id="{13AF4FC9-50F3-4305-B524-E02EFBA959D6}"/>
                 </a:ext>
               </a:extLst>
             </p:cNvPr>
@@ -11853,7 +11853,7 @@
               <p:cNvPr id="98" name="Cubo 94">
                 <a:extLst>
                   <a:ext uri="{FF2B5EF4-FFF2-40B4-BE49-F238E27FC236}">
-                    <a16:creationId xmlns="" xmlns:a16="http://schemas.microsoft.com/office/drawing/2014/main" id="{847D32AA-A911-4C4F-8CFB-512EECB742FA}"/>
+                    <a16:creationId xmlns:a16="http://schemas.microsoft.com/office/drawing/2014/main" xmlns="" id="{847D32AA-A911-4C4F-8CFB-512EECB742FA}"/>
                   </a:ext>
                 </a:extLst>
               </p:cNvPr>
@@ -11906,7 +11906,7 @@
               <p:cNvPr id="99" name="Conector recto 95">
                 <a:extLst>
                   <a:ext uri="{FF2B5EF4-FFF2-40B4-BE49-F238E27FC236}">
-                    <a16:creationId xmlns="" xmlns:a16="http://schemas.microsoft.com/office/drawing/2014/main" id="{86F69EB8-CC36-47FA-BFF9-B74CC8D36B43}"/>
+                    <a16:creationId xmlns:a16="http://schemas.microsoft.com/office/drawing/2014/main" xmlns="" id="{86F69EB8-CC36-47FA-BFF9-B74CC8D36B43}"/>
                   </a:ext>
                 </a:extLst>
               </p:cNvPr>
@@ -11943,7 +11943,7 @@
               <p:cNvPr id="100" name="Conector recto 96">
                 <a:extLst>
                   <a:ext uri="{FF2B5EF4-FFF2-40B4-BE49-F238E27FC236}">
-                    <a16:creationId xmlns="" xmlns:a16="http://schemas.microsoft.com/office/drawing/2014/main" id="{181A8021-6C14-4008-911E-0C8A25A1B8CB}"/>
+                    <a16:creationId xmlns:a16="http://schemas.microsoft.com/office/drawing/2014/main" xmlns="" id="{181A8021-6C14-4008-911E-0C8A25A1B8CB}"/>
                   </a:ext>
                 </a:extLst>
               </p:cNvPr>
@@ -11980,7 +11980,7 @@
               <p:cNvPr id="101" name="Conector recto 97">
                 <a:extLst>
                   <a:ext uri="{FF2B5EF4-FFF2-40B4-BE49-F238E27FC236}">
-                    <a16:creationId xmlns="" xmlns:a16="http://schemas.microsoft.com/office/drawing/2014/main" id="{40488C4B-3259-4A6B-8E2E-597EF1F17CAD}"/>
+                    <a16:creationId xmlns:a16="http://schemas.microsoft.com/office/drawing/2014/main" xmlns="" id="{40488C4B-3259-4A6B-8E2E-597EF1F17CAD}"/>
                   </a:ext>
                 </a:extLst>
               </p:cNvPr>
@@ -12019,7 +12019,7 @@
               <p:cNvPr id="102" name="Conector recto 98">
                 <a:extLst>
                   <a:ext uri="{FF2B5EF4-FFF2-40B4-BE49-F238E27FC236}">
-                    <a16:creationId xmlns="" xmlns:a16="http://schemas.microsoft.com/office/drawing/2014/main" id="{7E117B64-EBFA-4540-95F6-B6214E48A9F5}"/>
+                    <a16:creationId xmlns:a16="http://schemas.microsoft.com/office/drawing/2014/main" xmlns="" id="{7E117B64-EBFA-4540-95F6-B6214E48A9F5}"/>
                   </a:ext>
                 </a:extLst>
               </p:cNvPr>
@@ -12059,7 +12059,7 @@
             <p:cNvPr id="21" name="Grupo 17">
               <a:extLst>
                 <a:ext uri="{FF2B5EF4-FFF2-40B4-BE49-F238E27FC236}">
-                  <a16:creationId xmlns="" xmlns:a16="http://schemas.microsoft.com/office/drawing/2014/main" id="{51403B62-5F28-4DC2-9B08-88A54CDF72FB}"/>
+                  <a16:creationId xmlns:a16="http://schemas.microsoft.com/office/drawing/2014/main" xmlns="" id="{51403B62-5F28-4DC2-9B08-88A54CDF72FB}"/>
                 </a:ext>
               </a:extLst>
             </p:cNvPr>
@@ -12079,7 +12079,7 @@
               <p:cNvPr id="93" name="Cubo 89">
                 <a:extLst>
                   <a:ext uri="{FF2B5EF4-FFF2-40B4-BE49-F238E27FC236}">
-                    <a16:creationId xmlns="" xmlns:a16="http://schemas.microsoft.com/office/drawing/2014/main" id="{698AD8A9-F5FA-48EE-B0E4-5E8CEAFA64F6}"/>
+                    <a16:creationId xmlns:a16="http://schemas.microsoft.com/office/drawing/2014/main" xmlns="" id="{698AD8A9-F5FA-48EE-B0E4-5E8CEAFA64F6}"/>
                   </a:ext>
                 </a:extLst>
               </p:cNvPr>
@@ -12132,7 +12132,7 @@
               <p:cNvPr id="94" name="Conector recto 90">
                 <a:extLst>
                   <a:ext uri="{FF2B5EF4-FFF2-40B4-BE49-F238E27FC236}">
-                    <a16:creationId xmlns="" xmlns:a16="http://schemas.microsoft.com/office/drawing/2014/main" id="{1320946B-7E2B-4994-B72F-67435769BDDA}"/>
+                    <a16:creationId xmlns:a16="http://schemas.microsoft.com/office/drawing/2014/main" xmlns="" id="{1320946B-7E2B-4994-B72F-67435769BDDA}"/>
                   </a:ext>
                 </a:extLst>
               </p:cNvPr>
@@ -12169,7 +12169,7 @@
               <p:cNvPr id="95" name="Conector recto 91">
                 <a:extLst>
                   <a:ext uri="{FF2B5EF4-FFF2-40B4-BE49-F238E27FC236}">
-                    <a16:creationId xmlns="" xmlns:a16="http://schemas.microsoft.com/office/drawing/2014/main" id="{FAFDC132-3DD7-4F1A-9EEF-05E7B6DDFA27}"/>
+                    <a16:creationId xmlns:a16="http://schemas.microsoft.com/office/drawing/2014/main" xmlns="" id="{FAFDC132-3DD7-4F1A-9EEF-05E7B6DDFA27}"/>
                   </a:ext>
                 </a:extLst>
               </p:cNvPr>
@@ -12206,7 +12206,7 @@
               <p:cNvPr id="96" name="Conector recto 92">
                 <a:extLst>
                   <a:ext uri="{FF2B5EF4-FFF2-40B4-BE49-F238E27FC236}">
-                    <a16:creationId xmlns="" xmlns:a16="http://schemas.microsoft.com/office/drawing/2014/main" id="{3302E554-4EEC-41ED-AA55-148E628297E4}"/>
+                    <a16:creationId xmlns:a16="http://schemas.microsoft.com/office/drawing/2014/main" xmlns="" id="{3302E554-4EEC-41ED-AA55-148E628297E4}"/>
                   </a:ext>
                 </a:extLst>
               </p:cNvPr>
@@ -12245,7 +12245,7 @@
               <p:cNvPr id="97" name="Conector recto 93">
                 <a:extLst>
                   <a:ext uri="{FF2B5EF4-FFF2-40B4-BE49-F238E27FC236}">
-                    <a16:creationId xmlns="" xmlns:a16="http://schemas.microsoft.com/office/drawing/2014/main" id="{2AC81D4D-1224-4F83-A721-85919B0D233A}"/>
+                    <a16:creationId xmlns:a16="http://schemas.microsoft.com/office/drawing/2014/main" xmlns="" id="{2AC81D4D-1224-4F83-A721-85919B0D233A}"/>
                   </a:ext>
                 </a:extLst>
               </p:cNvPr>
@@ -12285,7 +12285,7 @@
             <p:cNvPr id="22" name="Grupo 18">
               <a:extLst>
                 <a:ext uri="{FF2B5EF4-FFF2-40B4-BE49-F238E27FC236}">
-                  <a16:creationId xmlns="" xmlns:a16="http://schemas.microsoft.com/office/drawing/2014/main" id="{72F1B65C-2D60-47DE-BAC0-57DB333B7E5A}"/>
+                  <a16:creationId xmlns:a16="http://schemas.microsoft.com/office/drawing/2014/main" xmlns="" id="{72F1B65C-2D60-47DE-BAC0-57DB333B7E5A}"/>
                 </a:ext>
               </a:extLst>
             </p:cNvPr>
@@ -12305,7 +12305,7 @@
               <p:cNvPr id="88" name="Cubo 84">
                 <a:extLst>
                   <a:ext uri="{FF2B5EF4-FFF2-40B4-BE49-F238E27FC236}">
-                    <a16:creationId xmlns="" xmlns:a16="http://schemas.microsoft.com/office/drawing/2014/main" id="{44DF9897-7A08-446D-832F-A0C86109FECB}"/>
+                    <a16:creationId xmlns:a16="http://schemas.microsoft.com/office/drawing/2014/main" xmlns="" id="{44DF9897-7A08-446D-832F-A0C86109FECB}"/>
                   </a:ext>
                 </a:extLst>
               </p:cNvPr>
@@ -12358,7 +12358,7 @@
               <p:cNvPr id="89" name="Conector recto 85">
                 <a:extLst>
                   <a:ext uri="{FF2B5EF4-FFF2-40B4-BE49-F238E27FC236}">
-                    <a16:creationId xmlns="" xmlns:a16="http://schemas.microsoft.com/office/drawing/2014/main" id="{E0FC6C3F-C67D-4285-8B4A-4DAC4F4A369B}"/>
+                    <a16:creationId xmlns:a16="http://schemas.microsoft.com/office/drawing/2014/main" xmlns="" id="{E0FC6C3F-C67D-4285-8B4A-4DAC4F4A369B}"/>
                   </a:ext>
                 </a:extLst>
               </p:cNvPr>
@@ -12395,7 +12395,7 @@
               <p:cNvPr id="90" name="Conector recto 86">
                 <a:extLst>
                   <a:ext uri="{FF2B5EF4-FFF2-40B4-BE49-F238E27FC236}">
-                    <a16:creationId xmlns="" xmlns:a16="http://schemas.microsoft.com/office/drawing/2014/main" id="{0089A52A-61BE-4ABD-93B8-C8AD2CE39C71}"/>
+                    <a16:creationId xmlns:a16="http://schemas.microsoft.com/office/drawing/2014/main" xmlns="" id="{0089A52A-61BE-4ABD-93B8-C8AD2CE39C71}"/>
                   </a:ext>
                 </a:extLst>
               </p:cNvPr>
@@ -12432,7 +12432,7 @@
               <p:cNvPr id="91" name="Conector recto 87">
                 <a:extLst>
                   <a:ext uri="{FF2B5EF4-FFF2-40B4-BE49-F238E27FC236}">
-                    <a16:creationId xmlns="" xmlns:a16="http://schemas.microsoft.com/office/drawing/2014/main" id="{EE668385-F5D1-442F-A30F-EAA4075B1494}"/>
+                    <a16:creationId xmlns:a16="http://schemas.microsoft.com/office/drawing/2014/main" xmlns="" id="{EE668385-F5D1-442F-A30F-EAA4075B1494}"/>
                   </a:ext>
                 </a:extLst>
               </p:cNvPr>
@@ -12471,7 +12471,7 @@
               <p:cNvPr id="92" name="Conector recto 88">
                 <a:extLst>
                   <a:ext uri="{FF2B5EF4-FFF2-40B4-BE49-F238E27FC236}">
-                    <a16:creationId xmlns="" xmlns:a16="http://schemas.microsoft.com/office/drawing/2014/main" id="{0925EE3A-CBCD-4D91-8107-B14311D489F2}"/>
+                    <a16:creationId xmlns:a16="http://schemas.microsoft.com/office/drawing/2014/main" xmlns="" id="{0925EE3A-CBCD-4D91-8107-B14311D489F2}"/>
                   </a:ext>
                 </a:extLst>
               </p:cNvPr>
@@ -12511,7 +12511,7 @@
             <p:cNvPr id="23" name="Grupo 19">
               <a:extLst>
                 <a:ext uri="{FF2B5EF4-FFF2-40B4-BE49-F238E27FC236}">
-                  <a16:creationId xmlns="" xmlns:a16="http://schemas.microsoft.com/office/drawing/2014/main" id="{B1E9883C-57BA-44A3-8ECA-D75D59F4CFB2}"/>
+                  <a16:creationId xmlns:a16="http://schemas.microsoft.com/office/drawing/2014/main" xmlns="" id="{B1E9883C-57BA-44A3-8ECA-D75D59F4CFB2}"/>
                 </a:ext>
               </a:extLst>
             </p:cNvPr>
@@ -12531,7 +12531,7 @@
               <p:cNvPr id="83" name="Cubo 79">
                 <a:extLst>
                   <a:ext uri="{FF2B5EF4-FFF2-40B4-BE49-F238E27FC236}">
-                    <a16:creationId xmlns="" xmlns:a16="http://schemas.microsoft.com/office/drawing/2014/main" id="{C43324DC-EE2A-40D0-B4B0-AAC43FF974B6}"/>
+                    <a16:creationId xmlns:a16="http://schemas.microsoft.com/office/drawing/2014/main" xmlns="" id="{C43324DC-EE2A-40D0-B4B0-AAC43FF974B6}"/>
                   </a:ext>
                 </a:extLst>
               </p:cNvPr>
@@ -12584,7 +12584,7 @@
               <p:cNvPr id="84" name="Conector recto 80">
                 <a:extLst>
                   <a:ext uri="{FF2B5EF4-FFF2-40B4-BE49-F238E27FC236}">
-                    <a16:creationId xmlns="" xmlns:a16="http://schemas.microsoft.com/office/drawing/2014/main" id="{BCF83797-2511-49FC-8DFB-97E15D21D8D5}"/>
+                    <a16:creationId xmlns:a16="http://schemas.microsoft.com/office/drawing/2014/main" xmlns="" id="{BCF83797-2511-49FC-8DFB-97E15D21D8D5}"/>
                   </a:ext>
                 </a:extLst>
               </p:cNvPr>
@@ -12621,7 +12621,7 @@
               <p:cNvPr id="85" name="Conector recto 81">
                 <a:extLst>
                   <a:ext uri="{FF2B5EF4-FFF2-40B4-BE49-F238E27FC236}">
-                    <a16:creationId xmlns="" xmlns:a16="http://schemas.microsoft.com/office/drawing/2014/main" id="{7F9BA142-F4FC-4457-9D35-95A35104BA02}"/>
+                    <a16:creationId xmlns:a16="http://schemas.microsoft.com/office/drawing/2014/main" xmlns="" id="{7F9BA142-F4FC-4457-9D35-95A35104BA02}"/>
                   </a:ext>
                 </a:extLst>
               </p:cNvPr>
@@ -12658,7 +12658,7 @@
               <p:cNvPr id="86" name="Conector recto 82">
                 <a:extLst>
                   <a:ext uri="{FF2B5EF4-FFF2-40B4-BE49-F238E27FC236}">
-                    <a16:creationId xmlns="" xmlns:a16="http://schemas.microsoft.com/office/drawing/2014/main" id="{12464077-7885-4A21-9736-2DC5C3B464DA}"/>
+                    <a16:creationId xmlns:a16="http://schemas.microsoft.com/office/drawing/2014/main" xmlns="" id="{12464077-7885-4A21-9736-2DC5C3B464DA}"/>
                   </a:ext>
                 </a:extLst>
               </p:cNvPr>
@@ -12697,7 +12697,7 @@
               <p:cNvPr id="87" name="Conector recto 83">
                 <a:extLst>
                   <a:ext uri="{FF2B5EF4-FFF2-40B4-BE49-F238E27FC236}">
-                    <a16:creationId xmlns="" xmlns:a16="http://schemas.microsoft.com/office/drawing/2014/main" id="{BE3A7944-53AC-4737-9DFB-76B3055E7B66}"/>
+                    <a16:creationId xmlns:a16="http://schemas.microsoft.com/office/drawing/2014/main" xmlns="" id="{BE3A7944-53AC-4737-9DFB-76B3055E7B66}"/>
                   </a:ext>
                 </a:extLst>
               </p:cNvPr>
@@ -12737,7 +12737,7 @@
             <p:cNvPr id="24" name="CuadroTexto 20">
               <a:extLst>
                 <a:ext uri="{FF2B5EF4-FFF2-40B4-BE49-F238E27FC236}">
-                  <a16:creationId xmlns="" xmlns:a16="http://schemas.microsoft.com/office/drawing/2014/main" id="{C9E76E01-050F-495F-98D1-76579C317E30}"/>
+                  <a16:creationId xmlns:a16="http://schemas.microsoft.com/office/drawing/2014/main" xmlns="" id="{C9E76E01-050F-495F-98D1-76579C317E30}"/>
                 </a:ext>
               </a:extLst>
             </p:cNvPr>
@@ -12785,7 +12785,7 @@
             <p:cNvPr id="25" name="Cerrar llave 21">
               <a:extLst>
                 <a:ext uri="{FF2B5EF4-FFF2-40B4-BE49-F238E27FC236}">
-                  <a16:creationId xmlns="" xmlns:a16="http://schemas.microsoft.com/office/drawing/2014/main" id="{42D73377-BB33-44FF-A50D-0C1BAE936F2A}"/>
+                  <a16:creationId xmlns:a16="http://schemas.microsoft.com/office/drawing/2014/main" xmlns="" id="{42D73377-BB33-44FF-A50D-0C1BAE936F2A}"/>
                 </a:ext>
               </a:extLst>
             </p:cNvPr>
@@ -12836,7 +12836,7 @@
             <p:cNvPr id="26" name="Rectángulo 22">
               <a:extLst>
                 <a:ext uri="{FF2B5EF4-FFF2-40B4-BE49-F238E27FC236}">
-                  <a16:creationId xmlns="" xmlns:a16="http://schemas.microsoft.com/office/drawing/2014/main" id="{ED5CE4A3-D156-43D3-AD14-0EEFADE3721A}"/>
+                  <a16:creationId xmlns:a16="http://schemas.microsoft.com/office/drawing/2014/main" xmlns="" id="{ED5CE4A3-D156-43D3-AD14-0EEFADE3721A}"/>
                 </a:ext>
               </a:extLst>
             </p:cNvPr>
@@ -12890,7 +12890,7 @@
             <p:cNvPr id="27" name="Flecha: doblada 23">
               <a:extLst>
                 <a:ext uri="{FF2B5EF4-FFF2-40B4-BE49-F238E27FC236}">
-                  <a16:creationId xmlns="" xmlns:a16="http://schemas.microsoft.com/office/drawing/2014/main" id="{F5E90C75-D41E-497F-B245-FE8CA3E768DB}"/>
+                  <a16:creationId xmlns:a16="http://schemas.microsoft.com/office/drawing/2014/main" xmlns="" id="{F5E90C75-D41E-497F-B245-FE8CA3E768DB}"/>
                 </a:ext>
               </a:extLst>
             </p:cNvPr>
@@ -12950,7 +12950,7 @@
             <p:cNvPr id="28" name="Flecha: doblada 24">
               <a:extLst>
                 <a:ext uri="{FF2B5EF4-FFF2-40B4-BE49-F238E27FC236}">
-                  <a16:creationId xmlns="" xmlns:a16="http://schemas.microsoft.com/office/drawing/2014/main" id="{32B9F592-1E54-45B4-8106-335E24B7A6F5}"/>
+                  <a16:creationId xmlns:a16="http://schemas.microsoft.com/office/drawing/2014/main" xmlns="" id="{32B9F592-1E54-45B4-8106-335E24B7A6F5}"/>
                 </a:ext>
               </a:extLst>
             </p:cNvPr>
@@ -13010,7 +13010,7 @@
             <p:cNvPr id="29" name="Flecha: doblada 25">
               <a:extLst>
                 <a:ext uri="{FF2B5EF4-FFF2-40B4-BE49-F238E27FC236}">
-                  <a16:creationId xmlns="" xmlns:a16="http://schemas.microsoft.com/office/drawing/2014/main" id="{39728A02-3196-4F06-8EC1-DE50D88DB74C}"/>
+                  <a16:creationId xmlns:a16="http://schemas.microsoft.com/office/drawing/2014/main" xmlns="" id="{39728A02-3196-4F06-8EC1-DE50D88DB74C}"/>
                 </a:ext>
               </a:extLst>
             </p:cNvPr>
@@ -13070,7 +13070,7 @@
             <p:cNvPr id="30" name="Flecha: doblada 26">
               <a:extLst>
                 <a:ext uri="{FF2B5EF4-FFF2-40B4-BE49-F238E27FC236}">
-                  <a16:creationId xmlns="" xmlns:a16="http://schemas.microsoft.com/office/drawing/2014/main" id="{B6417BC2-FCC6-4B50-B191-51A1DF716BB6}"/>
+                  <a16:creationId xmlns:a16="http://schemas.microsoft.com/office/drawing/2014/main" xmlns="" id="{B6417BC2-FCC6-4B50-B191-51A1DF716BB6}"/>
                 </a:ext>
               </a:extLst>
             </p:cNvPr>
@@ -13130,7 +13130,7 @@
             <p:cNvPr id="31" name="Flecha: doblada 27">
               <a:extLst>
                 <a:ext uri="{FF2B5EF4-FFF2-40B4-BE49-F238E27FC236}">
-                  <a16:creationId xmlns="" xmlns:a16="http://schemas.microsoft.com/office/drawing/2014/main" id="{4A8A302A-D42C-4836-BFC1-35D34C8EE975}"/>
+                  <a16:creationId xmlns:a16="http://schemas.microsoft.com/office/drawing/2014/main" xmlns="" id="{4A8A302A-D42C-4836-BFC1-35D34C8EE975}"/>
                 </a:ext>
               </a:extLst>
             </p:cNvPr>
@@ -13190,7 +13190,7 @@
             <p:cNvPr id="32" name="Flecha: doblada 28">
               <a:extLst>
                 <a:ext uri="{FF2B5EF4-FFF2-40B4-BE49-F238E27FC236}">
-                  <a16:creationId xmlns="" xmlns:a16="http://schemas.microsoft.com/office/drawing/2014/main" id="{3CF2F4C4-540C-4BD5-ADF5-1487BD324E7B}"/>
+                  <a16:creationId xmlns:a16="http://schemas.microsoft.com/office/drawing/2014/main" xmlns="" id="{3CF2F4C4-540C-4BD5-ADF5-1487BD324E7B}"/>
                 </a:ext>
               </a:extLst>
             </p:cNvPr>
@@ -13250,7 +13250,7 @@
             <p:cNvPr id="33" name="Flecha: doblada 29">
               <a:extLst>
                 <a:ext uri="{FF2B5EF4-FFF2-40B4-BE49-F238E27FC236}">
-                  <a16:creationId xmlns="" xmlns:a16="http://schemas.microsoft.com/office/drawing/2014/main" id="{C5A17F2A-F8ED-418B-BDBB-7055170888A1}"/>
+                  <a16:creationId xmlns:a16="http://schemas.microsoft.com/office/drawing/2014/main" xmlns="" id="{C5A17F2A-F8ED-418B-BDBB-7055170888A1}"/>
                 </a:ext>
               </a:extLst>
             </p:cNvPr>
@@ -13310,7 +13310,7 @@
             <p:cNvPr id="34" name="Flecha: doblada 30">
               <a:extLst>
                 <a:ext uri="{FF2B5EF4-FFF2-40B4-BE49-F238E27FC236}">
-                  <a16:creationId xmlns="" xmlns:a16="http://schemas.microsoft.com/office/drawing/2014/main" id="{0A0C670F-7EF5-46B0-89EF-245F641388B7}"/>
+                  <a16:creationId xmlns:a16="http://schemas.microsoft.com/office/drawing/2014/main" xmlns="" id="{0A0C670F-7EF5-46B0-89EF-245F641388B7}"/>
                 </a:ext>
               </a:extLst>
             </p:cNvPr>
@@ -13370,7 +13370,7 @@
             <p:cNvPr id="35" name="Flecha: doblada 31">
               <a:extLst>
                 <a:ext uri="{FF2B5EF4-FFF2-40B4-BE49-F238E27FC236}">
-                  <a16:creationId xmlns="" xmlns:a16="http://schemas.microsoft.com/office/drawing/2014/main" id="{397BB749-9597-4913-95DC-0976AA58A6EE}"/>
+                  <a16:creationId xmlns:a16="http://schemas.microsoft.com/office/drawing/2014/main" xmlns="" id="{397BB749-9597-4913-95DC-0976AA58A6EE}"/>
                 </a:ext>
               </a:extLst>
             </p:cNvPr>
@@ -13430,7 +13430,7 @@
             <p:cNvPr id="36" name="Flecha: doblada 32">
               <a:extLst>
                 <a:ext uri="{FF2B5EF4-FFF2-40B4-BE49-F238E27FC236}">
-                  <a16:creationId xmlns="" xmlns:a16="http://schemas.microsoft.com/office/drawing/2014/main" id="{F5840E80-FBCD-4710-969E-9FF4DAB05DEA}"/>
+                  <a16:creationId xmlns:a16="http://schemas.microsoft.com/office/drawing/2014/main" xmlns="" id="{F5840E80-FBCD-4710-969E-9FF4DAB05DEA}"/>
                 </a:ext>
               </a:extLst>
             </p:cNvPr>
@@ -13490,7 +13490,7 @@
             <p:cNvPr id="37" name="Conector recto de flecha 33">
               <a:extLst>
                 <a:ext uri="{FF2B5EF4-FFF2-40B4-BE49-F238E27FC236}">
-                  <a16:creationId xmlns="" xmlns:a16="http://schemas.microsoft.com/office/drawing/2014/main" id="{045BA5D5-8BE0-427C-B9C6-B4333E194C1A}"/>
+                  <a16:creationId xmlns:a16="http://schemas.microsoft.com/office/drawing/2014/main" xmlns="" id="{045BA5D5-8BE0-427C-B9C6-B4333E194C1A}"/>
                 </a:ext>
               </a:extLst>
             </p:cNvPr>
@@ -13529,7 +13529,7 @@
             <p:cNvPr id="38" name="Conector recto de flecha 34">
               <a:extLst>
                 <a:ext uri="{FF2B5EF4-FFF2-40B4-BE49-F238E27FC236}">
-                  <a16:creationId xmlns="" xmlns:a16="http://schemas.microsoft.com/office/drawing/2014/main" id="{47E63270-4FE0-4833-97B8-E5540A4A1887}"/>
+                  <a16:creationId xmlns:a16="http://schemas.microsoft.com/office/drawing/2014/main" xmlns="" id="{47E63270-4FE0-4833-97B8-E5540A4A1887}"/>
                 </a:ext>
               </a:extLst>
             </p:cNvPr>
@@ -13573,7 +13573,7 @@
             <p:cNvPr id="39" name="Conector recto de flecha 35">
               <a:extLst>
                 <a:ext uri="{FF2B5EF4-FFF2-40B4-BE49-F238E27FC236}">
-                  <a16:creationId xmlns="" xmlns:a16="http://schemas.microsoft.com/office/drawing/2014/main" id="{D4162DE1-F616-4EE5-BC24-7C4D71F67B39}"/>
+                  <a16:creationId xmlns:a16="http://schemas.microsoft.com/office/drawing/2014/main" xmlns="" id="{D4162DE1-F616-4EE5-BC24-7C4D71F67B39}"/>
                 </a:ext>
               </a:extLst>
             </p:cNvPr>
@@ -13617,7 +13617,7 @@
             <p:cNvPr id="40" name="Conector recto de flecha 36">
               <a:extLst>
                 <a:ext uri="{FF2B5EF4-FFF2-40B4-BE49-F238E27FC236}">
-                  <a16:creationId xmlns="" xmlns:a16="http://schemas.microsoft.com/office/drawing/2014/main" id="{497580EA-0A3B-4103-923B-ECEFF1DE91DA}"/>
+                  <a16:creationId xmlns:a16="http://schemas.microsoft.com/office/drawing/2014/main" xmlns="" id="{497580EA-0A3B-4103-923B-ECEFF1DE91DA}"/>
                 </a:ext>
               </a:extLst>
             </p:cNvPr>
@@ -13661,7 +13661,7 @@
             <p:cNvPr id="41" name="Conector recto de flecha 37">
               <a:extLst>
                 <a:ext uri="{FF2B5EF4-FFF2-40B4-BE49-F238E27FC236}">
-                  <a16:creationId xmlns="" xmlns:a16="http://schemas.microsoft.com/office/drawing/2014/main" id="{35AC0C20-F601-491B-A136-91F3A4156680}"/>
+                  <a16:creationId xmlns:a16="http://schemas.microsoft.com/office/drawing/2014/main" xmlns="" id="{35AC0C20-F601-491B-A136-91F3A4156680}"/>
                 </a:ext>
               </a:extLst>
             </p:cNvPr>
@@ -13705,7 +13705,7 @@
             <p:cNvPr id="42" name="Conector recto de flecha 38">
               <a:extLst>
                 <a:ext uri="{FF2B5EF4-FFF2-40B4-BE49-F238E27FC236}">
-                  <a16:creationId xmlns="" xmlns:a16="http://schemas.microsoft.com/office/drawing/2014/main" id="{FBC08C39-05F5-45EB-9F60-674FC452B327}"/>
+                  <a16:creationId xmlns:a16="http://schemas.microsoft.com/office/drawing/2014/main" xmlns="" id="{FBC08C39-05F5-45EB-9F60-674FC452B327}"/>
                 </a:ext>
               </a:extLst>
             </p:cNvPr>
@@ -13749,7 +13749,7 @@
             <p:cNvPr id="43" name="Conector recto de flecha 39">
               <a:extLst>
                 <a:ext uri="{FF2B5EF4-FFF2-40B4-BE49-F238E27FC236}">
-                  <a16:creationId xmlns="" xmlns:a16="http://schemas.microsoft.com/office/drawing/2014/main" id="{EBE0F045-608A-42BD-B35E-F38F9DE68688}"/>
+                  <a16:creationId xmlns:a16="http://schemas.microsoft.com/office/drawing/2014/main" xmlns="" id="{EBE0F045-608A-42BD-B35E-F38F9DE68688}"/>
                 </a:ext>
               </a:extLst>
             </p:cNvPr>
@@ -13788,7 +13788,7 @@
             <p:cNvPr id="44" name="Conector recto de flecha 40">
               <a:extLst>
                 <a:ext uri="{FF2B5EF4-FFF2-40B4-BE49-F238E27FC236}">
-                  <a16:creationId xmlns="" xmlns:a16="http://schemas.microsoft.com/office/drawing/2014/main" id="{09273893-D06A-46B7-98B7-C9C379DF717B}"/>
+                  <a16:creationId xmlns:a16="http://schemas.microsoft.com/office/drawing/2014/main" xmlns="" id="{09273893-D06A-46B7-98B7-C9C379DF717B}"/>
                 </a:ext>
               </a:extLst>
             </p:cNvPr>
@@ -13827,7 +13827,7 @@
             <p:cNvPr id="45" name="Conector recto de flecha 41">
               <a:extLst>
                 <a:ext uri="{FF2B5EF4-FFF2-40B4-BE49-F238E27FC236}">
-                  <a16:creationId xmlns="" xmlns:a16="http://schemas.microsoft.com/office/drawing/2014/main" id="{D0F18B0A-6B4F-41FD-A6D1-AAE23BA3DBF9}"/>
+                  <a16:creationId xmlns:a16="http://schemas.microsoft.com/office/drawing/2014/main" xmlns="" id="{D0F18B0A-6B4F-41FD-A6D1-AAE23BA3DBF9}"/>
                 </a:ext>
               </a:extLst>
             </p:cNvPr>
@@ -13867,7 +13867,7 @@
             <p:cNvPr id="46" name="Conector recto de flecha 42">
               <a:extLst>
                 <a:ext uri="{FF2B5EF4-FFF2-40B4-BE49-F238E27FC236}">
-                  <a16:creationId xmlns="" xmlns:a16="http://schemas.microsoft.com/office/drawing/2014/main" id="{D3C7812C-8DC6-4117-BF4A-B591142F0509}"/>
+                  <a16:creationId xmlns:a16="http://schemas.microsoft.com/office/drawing/2014/main" xmlns="" id="{D3C7812C-8DC6-4117-BF4A-B591142F0509}"/>
                 </a:ext>
               </a:extLst>
             </p:cNvPr>
@@ -13906,7 +13906,7 @@
             <p:cNvPr id="47" name="Conector recto de flecha 43">
               <a:extLst>
                 <a:ext uri="{FF2B5EF4-FFF2-40B4-BE49-F238E27FC236}">
-                  <a16:creationId xmlns="" xmlns:a16="http://schemas.microsoft.com/office/drawing/2014/main" id="{B4338653-4BAC-49F5-B0BB-340E2349877F}"/>
+                  <a16:creationId xmlns:a16="http://schemas.microsoft.com/office/drawing/2014/main" xmlns="" id="{B4338653-4BAC-49F5-B0BB-340E2349877F}"/>
                 </a:ext>
               </a:extLst>
             </p:cNvPr>
@@ -13945,7 +13945,7 @@
             <p:cNvPr id="48" name="Conector recto de flecha 44">
               <a:extLst>
                 <a:ext uri="{FF2B5EF4-FFF2-40B4-BE49-F238E27FC236}">
-                  <a16:creationId xmlns="" xmlns:a16="http://schemas.microsoft.com/office/drawing/2014/main" id="{CA84B5D7-DFF3-4655-B039-E79E6742DC92}"/>
+                  <a16:creationId xmlns:a16="http://schemas.microsoft.com/office/drawing/2014/main" xmlns="" id="{CA84B5D7-DFF3-4655-B039-E79E6742DC92}"/>
                 </a:ext>
               </a:extLst>
             </p:cNvPr>
@@ -13985,7 +13985,7 @@
             <p:cNvPr id="49" name="Flecha: doblada 45">
               <a:extLst>
                 <a:ext uri="{FF2B5EF4-FFF2-40B4-BE49-F238E27FC236}">
-                  <a16:creationId xmlns="" xmlns:a16="http://schemas.microsoft.com/office/drawing/2014/main" id="{76240802-0607-469E-A4B1-D41ABEE1FE20}"/>
+                  <a16:creationId xmlns:a16="http://schemas.microsoft.com/office/drawing/2014/main" xmlns="" id="{76240802-0607-469E-A4B1-D41ABEE1FE20}"/>
                 </a:ext>
               </a:extLst>
             </p:cNvPr>
@@ -14050,7 +14050,7 @@
             <p:cNvPr id="50" name="Flecha: doblada 46">
               <a:extLst>
                 <a:ext uri="{FF2B5EF4-FFF2-40B4-BE49-F238E27FC236}">
-                  <a16:creationId xmlns="" xmlns:a16="http://schemas.microsoft.com/office/drawing/2014/main" id="{CB98FE7F-8B38-41C3-B369-67B94F095D95}"/>
+                  <a16:creationId xmlns:a16="http://schemas.microsoft.com/office/drawing/2014/main" xmlns="" id="{CB98FE7F-8B38-41C3-B369-67B94F095D95}"/>
                 </a:ext>
               </a:extLst>
             </p:cNvPr>
@@ -14115,7 +14115,7 @@
             <p:cNvPr id="51" name="Flecha: doblada 47">
               <a:extLst>
                 <a:ext uri="{FF2B5EF4-FFF2-40B4-BE49-F238E27FC236}">
-                  <a16:creationId xmlns="" xmlns:a16="http://schemas.microsoft.com/office/drawing/2014/main" id="{623A0B19-991E-43DE-BD0A-0E6750F38A5E}"/>
+                  <a16:creationId xmlns:a16="http://schemas.microsoft.com/office/drawing/2014/main" xmlns="" id="{623A0B19-991E-43DE-BD0A-0E6750F38A5E}"/>
                 </a:ext>
               </a:extLst>
             </p:cNvPr>
@@ -14180,7 +14180,7 @@
             <p:cNvPr id="52" name="Flecha: doblada 48">
               <a:extLst>
                 <a:ext uri="{FF2B5EF4-FFF2-40B4-BE49-F238E27FC236}">
-                  <a16:creationId xmlns="" xmlns:a16="http://schemas.microsoft.com/office/drawing/2014/main" id="{D9196618-13A8-45A8-8DFB-DED71E0F397A}"/>
+                  <a16:creationId xmlns:a16="http://schemas.microsoft.com/office/drawing/2014/main" xmlns="" id="{D9196618-13A8-45A8-8DFB-DED71E0F397A}"/>
                 </a:ext>
               </a:extLst>
             </p:cNvPr>
@@ -14245,7 +14245,7 @@
             <p:cNvPr id="53" name="Flecha: doblada 49">
               <a:extLst>
                 <a:ext uri="{FF2B5EF4-FFF2-40B4-BE49-F238E27FC236}">
-                  <a16:creationId xmlns="" xmlns:a16="http://schemas.microsoft.com/office/drawing/2014/main" id="{9F5F29E9-CB56-43A0-8AE4-CEF2DC00C058}"/>
+                  <a16:creationId xmlns:a16="http://schemas.microsoft.com/office/drawing/2014/main" xmlns="" id="{9F5F29E9-CB56-43A0-8AE4-CEF2DC00C058}"/>
                 </a:ext>
               </a:extLst>
             </p:cNvPr>
@@ -14310,7 +14310,7 @@
             <p:cNvPr id="54" name="Flecha: doblada 50">
               <a:extLst>
                 <a:ext uri="{FF2B5EF4-FFF2-40B4-BE49-F238E27FC236}">
-                  <a16:creationId xmlns="" xmlns:a16="http://schemas.microsoft.com/office/drawing/2014/main" id="{4C4FE2FB-2CBD-49FC-B3C3-9464DA960BB9}"/>
+                  <a16:creationId xmlns:a16="http://schemas.microsoft.com/office/drawing/2014/main" xmlns="" id="{4C4FE2FB-2CBD-49FC-B3C3-9464DA960BB9}"/>
                 </a:ext>
               </a:extLst>
             </p:cNvPr>
@@ -14375,7 +14375,7 @@
             <p:cNvPr id="55" name="Flecha: doblada 51">
               <a:extLst>
                 <a:ext uri="{FF2B5EF4-FFF2-40B4-BE49-F238E27FC236}">
-                  <a16:creationId xmlns="" xmlns:a16="http://schemas.microsoft.com/office/drawing/2014/main" id="{387769C7-4A4D-429E-8741-C906100EE2C3}"/>
+                  <a16:creationId xmlns:a16="http://schemas.microsoft.com/office/drawing/2014/main" xmlns="" id="{387769C7-4A4D-429E-8741-C906100EE2C3}"/>
                 </a:ext>
               </a:extLst>
             </p:cNvPr>
@@ -14440,7 +14440,7 @@
             <p:cNvPr id="56" name="Flecha: doblada 52">
               <a:extLst>
                 <a:ext uri="{FF2B5EF4-FFF2-40B4-BE49-F238E27FC236}">
-                  <a16:creationId xmlns="" xmlns:a16="http://schemas.microsoft.com/office/drawing/2014/main" id="{169BFD3D-33F6-4320-91CE-06052206D81E}"/>
+                  <a16:creationId xmlns:a16="http://schemas.microsoft.com/office/drawing/2014/main" xmlns="" id="{169BFD3D-33F6-4320-91CE-06052206D81E}"/>
                 </a:ext>
               </a:extLst>
             </p:cNvPr>
@@ -14505,7 +14505,7 @@
             <p:cNvPr id="57" name="Flecha: doblada 53">
               <a:extLst>
                 <a:ext uri="{FF2B5EF4-FFF2-40B4-BE49-F238E27FC236}">
-                  <a16:creationId xmlns="" xmlns:a16="http://schemas.microsoft.com/office/drawing/2014/main" id="{8D912D19-B977-4F89-8DCB-C9D3F810DAB4}"/>
+                  <a16:creationId xmlns:a16="http://schemas.microsoft.com/office/drawing/2014/main" xmlns="" id="{8D912D19-B977-4F89-8DCB-C9D3F810DAB4}"/>
                 </a:ext>
               </a:extLst>
             </p:cNvPr>
@@ -14570,7 +14570,7 @@
             <p:cNvPr id="58" name="Flecha: doblada 54">
               <a:extLst>
                 <a:ext uri="{FF2B5EF4-FFF2-40B4-BE49-F238E27FC236}">
-                  <a16:creationId xmlns="" xmlns:a16="http://schemas.microsoft.com/office/drawing/2014/main" id="{2B5480CA-0C38-4048-A0CE-391848FE5899}"/>
+                  <a16:creationId xmlns:a16="http://schemas.microsoft.com/office/drawing/2014/main" xmlns="" id="{2B5480CA-0C38-4048-A0CE-391848FE5899}"/>
                 </a:ext>
               </a:extLst>
             </p:cNvPr>
@@ -14635,7 +14635,7 @@
             <p:cNvPr id="59" name="Conector recto de flecha 55">
               <a:extLst>
                 <a:ext uri="{FF2B5EF4-FFF2-40B4-BE49-F238E27FC236}">
-                  <a16:creationId xmlns="" xmlns:a16="http://schemas.microsoft.com/office/drawing/2014/main" id="{3E1F1B50-C11D-4A8B-BEE6-98A9A1929719}"/>
+                  <a16:creationId xmlns:a16="http://schemas.microsoft.com/office/drawing/2014/main" xmlns="" id="{3E1F1B50-C11D-4A8B-BEE6-98A9A1929719}"/>
                 </a:ext>
               </a:extLst>
             </p:cNvPr>
@@ -14674,7 +14674,7 @@
             <p:cNvPr id="60" name="Conector recto de flecha 56">
               <a:extLst>
                 <a:ext uri="{FF2B5EF4-FFF2-40B4-BE49-F238E27FC236}">
-                  <a16:creationId xmlns="" xmlns:a16="http://schemas.microsoft.com/office/drawing/2014/main" id="{71F1B8C8-2771-483E-8D6F-8E999ECC899F}"/>
+                  <a16:creationId xmlns:a16="http://schemas.microsoft.com/office/drawing/2014/main" xmlns="" id="{71F1B8C8-2771-483E-8D6F-8E999ECC899F}"/>
                 </a:ext>
               </a:extLst>
             </p:cNvPr>
@@ -14713,7 +14713,7 @@
             <p:cNvPr id="61" name="Conector recto de flecha 57">
               <a:extLst>
                 <a:ext uri="{FF2B5EF4-FFF2-40B4-BE49-F238E27FC236}">
-                  <a16:creationId xmlns="" xmlns:a16="http://schemas.microsoft.com/office/drawing/2014/main" id="{1934D8D3-C975-447F-AC95-72A71E4BB5D3}"/>
+                  <a16:creationId xmlns:a16="http://schemas.microsoft.com/office/drawing/2014/main" xmlns="" id="{1934D8D3-C975-447F-AC95-72A71E4BB5D3}"/>
                 </a:ext>
               </a:extLst>
             </p:cNvPr>
@@ -14753,7 +14753,7 @@
             <p:cNvPr id="62" name="Conector recto de flecha 58">
               <a:extLst>
                 <a:ext uri="{FF2B5EF4-FFF2-40B4-BE49-F238E27FC236}">
-                  <a16:creationId xmlns="" xmlns:a16="http://schemas.microsoft.com/office/drawing/2014/main" id="{BC9F24CB-1B55-406E-8129-0AEECE9BADA9}"/>
+                  <a16:creationId xmlns:a16="http://schemas.microsoft.com/office/drawing/2014/main" xmlns="" id="{BC9F24CB-1B55-406E-8129-0AEECE9BADA9}"/>
                 </a:ext>
               </a:extLst>
             </p:cNvPr>
@@ -14792,7 +14792,7 @@
             <p:cNvPr id="63" name="Conector recto de flecha 59">
               <a:extLst>
                 <a:ext uri="{FF2B5EF4-FFF2-40B4-BE49-F238E27FC236}">
-                  <a16:creationId xmlns="" xmlns:a16="http://schemas.microsoft.com/office/drawing/2014/main" id="{F911ECB2-14F6-4249-BDD3-4B3491ED81DC}"/>
+                  <a16:creationId xmlns:a16="http://schemas.microsoft.com/office/drawing/2014/main" xmlns="" id="{F911ECB2-14F6-4249-BDD3-4B3491ED81DC}"/>
                 </a:ext>
               </a:extLst>
             </p:cNvPr>
@@ -14831,7 +14831,7 @@
             <p:cNvPr id="64" name="Conector recto de flecha 60">
               <a:extLst>
                 <a:ext uri="{FF2B5EF4-FFF2-40B4-BE49-F238E27FC236}">
-                  <a16:creationId xmlns="" xmlns:a16="http://schemas.microsoft.com/office/drawing/2014/main" id="{B0E134EB-611B-4ECE-A545-71887BA62C3F}"/>
+                  <a16:creationId xmlns:a16="http://schemas.microsoft.com/office/drawing/2014/main" xmlns="" id="{B0E134EB-611B-4ECE-A545-71887BA62C3F}"/>
                 </a:ext>
               </a:extLst>
             </p:cNvPr>
@@ -14871,7 +14871,7 @@
             <p:cNvPr id="65" name="Conector recto de flecha 61">
               <a:extLst>
                 <a:ext uri="{FF2B5EF4-FFF2-40B4-BE49-F238E27FC236}">
-                  <a16:creationId xmlns="" xmlns:a16="http://schemas.microsoft.com/office/drawing/2014/main" id="{FF11261D-658A-4EE4-BDD4-9300B565F0F0}"/>
+                  <a16:creationId xmlns:a16="http://schemas.microsoft.com/office/drawing/2014/main" xmlns="" id="{FF11261D-658A-4EE4-BDD4-9300B565F0F0}"/>
                 </a:ext>
               </a:extLst>
             </p:cNvPr>
@@ -14910,7 +14910,7 @@
             <p:cNvPr id="66" name="Conector recto de flecha 62">
               <a:extLst>
                 <a:ext uri="{FF2B5EF4-FFF2-40B4-BE49-F238E27FC236}">
-                  <a16:creationId xmlns="" xmlns:a16="http://schemas.microsoft.com/office/drawing/2014/main" id="{ED92CC4E-3B67-44FE-8CF6-F4653018DBD7}"/>
+                  <a16:creationId xmlns:a16="http://schemas.microsoft.com/office/drawing/2014/main" xmlns="" id="{ED92CC4E-3B67-44FE-8CF6-F4653018DBD7}"/>
                 </a:ext>
               </a:extLst>
             </p:cNvPr>
@@ -14949,7 +14949,7 @@
             <p:cNvPr id="67" name="Conector recto de flecha 63">
               <a:extLst>
                 <a:ext uri="{FF2B5EF4-FFF2-40B4-BE49-F238E27FC236}">
-                  <a16:creationId xmlns="" xmlns:a16="http://schemas.microsoft.com/office/drawing/2014/main" id="{5744E14B-5E1E-41F3-B67F-A64BB7D07ED5}"/>
+                  <a16:creationId xmlns:a16="http://schemas.microsoft.com/office/drawing/2014/main" xmlns="" id="{5744E14B-5E1E-41F3-B67F-A64BB7D07ED5}"/>
                 </a:ext>
               </a:extLst>
             </p:cNvPr>
@@ -14989,7 +14989,7 @@
             <p:cNvPr id="68" name="Conector recto de flecha 64">
               <a:extLst>
                 <a:ext uri="{FF2B5EF4-FFF2-40B4-BE49-F238E27FC236}">
-                  <a16:creationId xmlns="" xmlns:a16="http://schemas.microsoft.com/office/drawing/2014/main" id="{9CCF5760-CB8E-4B4F-A5F2-DD813F5180EA}"/>
+                  <a16:creationId xmlns:a16="http://schemas.microsoft.com/office/drawing/2014/main" xmlns="" id="{9CCF5760-CB8E-4B4F-A5F2-DD813F5180EA}"/>
                 </a:ext>
               </a:extLst>
             </p:cNvPr>
@@ -15028,7 +15028,7 @@
             <p:cNvPr id="69" name="Conector recto de flecha 65">
               <a:extLst>
                 <a:ext uri="{FF2B5EF4-FFF2-40B4-BE49-F238E27FC236}">
-                  <a16:creationId xmlns="" xmlns:a16="http://schemas.microsoft.com/office/drawing/2014/main" id="{241A1F98-8622-4E36-A83A-DBA1A47B851F}"/>
+                  <a16:creationId xmlns:a16="http://schemas.microsoft.com/office/drawing/2014/main" xmlns="" id="{241A1F98-8622-4E36-A83A-DBA1A47B851F}"/>
                 </a:ext>
               </a:extLst>
             </p:cNvPr>
@@ -15067,7 +15067,7 @@
             <p:cNvPr id="70" name="Conector recto de flecha 66">
               <a:extLst>
                 <a:ext uri="{FF2B5EF4-FFF2-40B4-BE49-F238E27FC236}">
-                  <a16:creationId xmlns="" xmlns:a16="http://schemas.microsoft.com/office/drawing/2014/main" id="{01E6DF00-5D29-4FD7-8BBD-A8167BA69591}"/>
+                  <a16:creationId xmlns:a16="http://schemas.microsoft.com/office/drawing/2014/main" xmlns="" id="{01E6DF00-5D29-4FD7-8BBD-A8167BA69591}"/>
                 </a:ext>
               </a:extLst>
             </p:cNvPr>
@@ -15107,7 +15107,7 @@
             <p:cNvPr id="71" name="Conector recto de flecha 67">
               <a:extLst>
                 <a:ext uri="{FF2B5EF4-FFF2-40B4-BE49-F238E27FC236}">
-                  <a16:creationId xmlns="" xmlns:a16="http://schemas.microsoft.com/office/drawing/2014/main" id="{29248CD6-EA0B-473A-8263-3374F324DA2F}"/>
+                  <a16:creationId xmlns:a16="http://schemas.microsoft.com/office/drawing/2014/main" xmlns="" id="{29248CD6-EA0B-473A-8263-3374F324DA2F}"/>
                 </a:ext>
               </a:extLst>
             </p:cNvPr>
@@ -15146,7 +15146,7 @@
             <p:cNvPr id="72" name="Conector recto de flecha 68">
               <a:extLst>
                 <a:ext uri="{FF2B5EF4-FFF2-40B4-BE49-F238E27FC236}">
-                  <a16:creationId xmlns="" xmlns:a16="http://schemas.microsoft.com/office/drawing/2014/main" id="{9EF647F3-5A9A-4821-9C96-955D7F230689}"/>
+                  <a16:creationId xmlns:a16="http://schemas.microsoft.com/office/drawing/2014/main" xmlns="" id="{9EF647F3-5A9A-4821-9C96-955D7F230689}"/>
                 </a:ext>
               </a:extLst>
             </p:cNvPr>
@@ -15185,7 +15185,7 @@
             <p:cNvPr id="73" name="Conector recto de flecha 69">
               <a:extLst>
                 <a:ext uri="{FF2B5EF4-FFF2-40B4-BE49-F238E27FC236}">
-                  <a16:creationId xmlns="" xmlns:a16="http://schemas.microsoft.com/office/drawing/2014/main" id="{7564473B-48F4-4A27-9391-237176EFA8A4}"/>
+                  <a16:creationId xmlns:a16="http://schemas.microsoft.com/office/drawing/2014/main" xmlns="" id="{7564473B-48F4-4A27-9391-237176EFA8A4}"/>
                 </a:ext>
               </a:extLst>
             </p:cNvPr>
@@ -15225,7 +15225,7 @@
             <p:cNvPr id="74" name="Conector recto de flecha 70">
               <a:extLst>
                 <a:ext uri="{FF2B5EF4-FFF2-40B4-BE49-F238E27FC236}">
-                  <a16:creationId xmlns="" xmlns:a16="http://schemas.microsoft.com/office/drawing/2014/main" id="{432B20E6-F9A8-47C7-889D-927B7A4707E5}"/>
+                  <a16:creationId xmlns:a16="http://schemas.microsoft.com/office/drawing/2014/main" xmlns="" id="{432B20E6-F9A8-47C7-889D-927B7A4707E5}"/>
                 </a:ext>
               </a:extLst>
             </p:cNvPr>
@@ -15264,7 +15264,7 @@
             <p:cNvPr id="75" name="Conector recto de flecha 71">
               <a:extLst>
                 <a:ext uri="{FF2B5EF4-FFF2-40B4-BE49-F238E27FC236}">
-                  <a16:creationId xmlns="" xmlns:a16="http://schemas.microsoft.com/office/drawing/2014/main" id="{C0B8C3D8-F1BA-4AE0-A874-FAA322D598F5}"/>
+                  <a16:creationId xmlns:a16="http://schemas.microsoft.com/office/drawing/2014/main" xmlns="" id="{C0B8C3D8-F1BA-4AE0-A874-FAA322D598F5}"/>
                 </a:ext>
               </a:extLst>
             </p:cNvPr>
@@ -15303,7 +15303,7 @@
             <p:cNvPr id="76" name="Conector recto de flecha 72">
               <a:extLst>
                 <a:ext uri="{FF2B5EF4-FFF2-40B4-BE49-F238E27FC236}">
-                  <a16:creationId xmlns="" xmlns:a16="http://schemas.microsoft.com/office/drawing/2014/main" id="{0A0C83AE-C05D-4F89-8D9D-70467557BDB1}"/>
+                  <a16:creationId xmlns:a16="http://schemas.microsoft.com/office/drawing/2014/main" xmlns="" id="{0A0C83AE-C05D-4F89-8D9D-70467557BDB1}"/>
                 </a:ext>
               </a:extLst>
             </p:cNvPr>
@@ -15343,7 +15343,7 @@
             <p:cNvPr id="77" name="Conector recto de flecha 73">
               <a:extLst>
                 <a:ext uri="{FF2B5EF4-FFF2-40B4-BE49-F238E27FC236}">
-                  <a16:creationId xmlns="" xmlns:a16="http://schemas.microsoft.com/office/drawing/2014/main" id="{62C629E2-7860-4E3D-92F1-AA13F4AEA592}"/>
+                  <a16:creationId xmlns:a16="http://schemas.microsoft.com/office/drawing/2014/main" xmlns="" id="{62C629E2-7860-4E3D-92F1-AA13F4AEA592}"/>
                 </a:ext>
               </a:extLst>
             </p:cNvPr>
@@ -15382,7 +15382,7 @@
             <p:cNvPr id="78" name="Conector recto de flecha 74">
               <a:extLst>
                 <a:ext uri="{FF2B5EF4-FFF2-40B4-BE49-F238E27FC236}">
-                  <a16:creationId xmlns="" xmlns:a16="http://schemas.microsoft.com/office/drawing/2014/main" id="{E271367E-A9F2-484B-88B3-39C35C158DE9}"/>
+                  <a16:creationId xmlns:a16="http://schemas.microsoft.com/office/drawing/2014/main" xmlns="" id="{E271367E-A9F2-484B-88B3-39C35C158DE9}"/>
                 </a:ext>
               </a:extLst>
             </p:cNvPr>
@@ -15421,7 +15421,7 @@
             <p:cNvPr id="79" name="Conector recto de flecha 75">
               <a:extLst>
                 <a:ext uri="{FF2B5EF4-FFF2-40B4-BE49-F238E27FC236}">
-                  <a16:creationId xmlns="" xmlns:a16="http://schemas.microsoft.com/office/drawing/2014/main" id="{8C05E4F2-2561-495B-AF1D-47E9B9D168E5}"/>
+                  <a16:creationId xmlns:a16="http://schemas.microsoft.com/office/drawing/2014/main" xmlns="" id="{8C05E4F2-2561-495B-AF1D-47E9B9D168E5}"/>
                 </a:ext>
               </a:extLst>
             </p:cNvPr>
@@ -15461,7 +15461,7 @@
             <p:cNvPr id="80" name="Conector recto de flecha 76">
               <a:extLst>
                 <a:ext uri="{FF2B5EF4-FFF2-40B4-BE49-F238E27FC236}">
-                  <a16:creationId xmlns="" xmlns:a16="http://schemas.microsoft.com/office/drawing/2014/main" id="{016E5256-F785-4394-AAB1-2D91A66195A9}"/>
+                  <a16:creationId xmlns:a16="http://schemas.microsoft.com/office/drawing/2014/main" xmlns="" id="{016E5256-F785-4394-AAB1-2D91A66195A9}"/>
                 </a:ext>
               </a:extLst>
             </p:cNvPr>
@@ -15500,7 +15500,7 @@
             <p:cNvPr id="81" name="Conector recto de flecha 77">
               <a:extLst>
                 <a:ext uri="{FF2B5EF4-FFF2-40B4-BE49-F238E27FC236}">
-                  <a16:creationId xmlns="" xmlns:a16="http://schemas.microsoft.com/office/drawing/2014/main" id="{BCA1C189-F3E5-4C39-9C66-A24F2DA979FA}"/>
+                  <a16:creationId xmlns:a16="http://schemas.microsoft.com/office/drawing/2014/main" xmlns="" id="{BCA1C189-F3E5-4C39-9C66-A24F2DA979FA}"/>
                 </a:ext>
               </a:extLst>
             </p:cNvPr>
@@ -15539,7 +15539,7 @@
             <p:cNvPr id="82" name="Conector recto de flecha 78">
               <a:extLst>
                 <a:ext uri="{FF2B5EF4-FFF2-40B4-BE49-F238E27FC236}">
-                  <a16:creationId xmlns="" xmlns:a16="http://schemas.microsoft.com/office/drawing/2014/main" id="{505DE7F7-E790-4D34-B482-B82AF0DEFBCC}"/>
+                  <a16:creationId xmlns:a16="http://schemas.microsoft.com/office/drawing/2014/main" xmlns="" id="{505DE7F7-E790-4D34-B482-B82AF0DEFBCC}"/>
                 </a:ext>
               </a:extLst>
             </p:cNvPr>
@@ -16908,7 +16908,7 @@
           <p:cNvPr id="8" name="Grupo 1">
             <a:extLst>
               <a:ext uri="{FF2B5EF4-FFF2-40B4-BE49-F238E27FC236}">
-                <a16:creationId xmlns="" xmlns:a16="http://schemas.microsoft.com/office/drawing/2014/main" id="{5132884D-3B63-4201-A705-A3E0633EE6F3}"/>
+                <a16:creationId xmlns:a16="http://schemas.microsoft.com/office/drawing/2014/main" xmlns="" id="{5132884D-3B63-4201-A705-A3E0633EE6F3}"/>
               </a:ext>
             </a:extLst>
           </p:cNvPr>
@@ -16928,7 +16928,7 @@
             <p:cNvPr id="9" name="Picture 8" descr="Resultado de imagen para rio tocuyo">
               <a:extLst>
                 <a:ext uri="{FF2B5EF4-FFF2-40B4-BE49-F238E27FC236}">
-                  <a16:creationId xmlns="" xmlns:a16="http://schemas.microsoft.com/office/drawing/2014/main" id="{F39BE009-584A-480B-80BE-5BC5246F0B79}"/>
+                  <a16:creationId xmlns:a16="http://schemas.microsoft.com/office/drawing/2014/main" xmlns="" id="{F39BE009-584A-480B-80BE-5BC5246F0B79}"/>
                 </a:ext>
               </a:extLst>
             </p:cNvPr>
@@ -16975,7 +16975,7 @@
             <p:cNvPr id="10" name="Grupo 3">
               <a:extLst>
                 <a:ext uri="{FF2B5EF4-FFF2-40B4-BE49-F238E27FC236}">
-                  <a16:creationId xmlns="" xmlns:a16="http://schemas.microsoft.com/office/drawing/2014/main" id="{714CB93D-F9D5-44A2-B46E-73BD778EDBBA}"/>
+                  <a16:creationId xmlns:a16="http://schemas.microsoft.com/office/drawing/2014/main" xmlns="" id="{714CB93D-F9D5-44A2-B46E-73BD778EDBBA}"/>
                 </a:ext>
               </a:extLst>
             </p:cNvPr>
@@ -16995,7 +16995,7 @@
               <p:cNvPr id="31" name="Rectángulo 24">
                 <a:extLst>
                   <a:ext uri="{FF2B5EF4-FFF2-40B4-BE49-F238E27FC236}">
-                    <a16:creationId xmlns="" xmlns:a16="http://schemas.microsoft.com/office/drawing/2014/main" id="{B5DC2C0B-F606-4772-B31D-76508C42F755}"/>
+                    <a16:creationId xmlns:a16="http://schemas.microsoft.com/office/drawing/2014/main" xmlns="" id="{B5DC2C0B-F606-4772-B31D-76508C42F755}"/>
                   </a:ext>
                 </a:extLst>
               </p:cNvPr>
@@ -17055,7 +17055,7 @@
               <p:cNvPr id="32" name="Rectángulo 25">
                 <a:extLst>
                   <a:ext uri="{FF2B5EF4-FFF2-40B4-BE49-F238E27FC236}">
-                    <a16:creationId xmlns="" xmlns:a16="http://schemas.microsoft.com/office/drawing/2014/main" id="{973FB5E7-92F5-4BCD-93BE-AB75A8778A30}"/>
+                    <a16:creationId xmlns:a16="http://schemas.microsoft.com/office/drawing/2014/main" xmlns="" id="{973FB5E7-92F5-4BCD-93BE-AB75A8778A30}"/>
                   </a:ext>
                 </a:extLst>
               </p:cNvPr>
@@ -17117,7 +17117,7 @@
                   <p:cNvPr id="33" name="CuadroTexto 26">
                     <a:extLst>
                       <a:ext uri="{FF2B5EF4-FFF2-40B4-BE49-F238E27FC236}">
-                        <a16:creationId xmlns="" xmlns:a16="http://schemas.microsoft.com/office/drawing/2014/main" id="{DFC1A740-921B-41B5-9A9D-5E574039622A}"/>
+                        <a16:creationId xmlns:a16="http://schemas.microsoft.com/office/drawing/2014/main" xmlns="" id="{DFC1A740-921B-41B5-9A9D-5E574039622A}"/>
                       </a:ext>
                     </a:extLst>
                   </p:cNvPr>
@@ -17527,7 +17527,7 @@
             <p:cNvPr id="11" name="Flecha: a la derecha 4">
               <a:extLst>
                 <a:ext uri="{FF2B5EF4-FFF2-40B4-BE49-F238E27FC236}">
-                  <a16:creationId xmlns="" xmlns:a16="http://schemas.microsoft.com/office/drawing/2014/main" id="{3572ADA6-3D7D-486F-8062-05F17625C075}"/>
+                  <a16:creationId xmlns:a16="http://schemas.microsoft.com/office/drawing/2014/main" xmlns="" id="{3572ADA6-3D7D-486F-8062-05F17625C075}"/>
                 </a:ext>
               </a:extLst>
             </p:cNvPr>
@@ -17573,7 +17573,7 @@
             <p:cNvPr id="12" name="Imagen 5">
               <a:extLst>
                 <a:ext uri="{FF2B5EF4-FFF2-40B4-BE49-F238E27FC236}">
-                  <a16:creationId xmlns="" xmlns:a16="http://schemas.microsoft.com/office/drawing/2014/main" id="{F6A0B718-06A1-4EDB-834A-0E64012B0403}"/>
+                  <a16:creationId xmlns:a16="http://schemas.microsoft.com/office/drawing/2014/main" xmlns="" id="{F6A0B718-06A1-4EDB-834A-0E64012B0403}"/>
                 </a:ext>
               </a:extLst>
             </p:cNvPr>
@@ -17601,7 +17601,7 @@
             <p:cNvPr id="13" name="Imagen 6">
               <a:extLst>
                 <a:ext uri="{FF2B5EF4-FFF2-40B4-BE49-F238E27FC236}">
-                  <a16:creationId xmlns="" xmlns:a16="http://schemas.microsoft.com/office/drawing/2014/main" id="{9645E73F-BE28-48D9-9BE5-5B9C1F0C0C97}"/>
+                  <a16:creationId xmlns:a16="http://schemas.microsoft.com/office/drawing/2014/main" xmlns="" id="{9645E73F-BE28-48D9-9BE5-5B9C1F0C0C97}"/>
                 </a:ext>
               </a:extLst>
             </p:cNvPr>
@@ -17635,7 +17635,7 @@
             <p:cNvPr id="14" name="Rectángulo 7">
               <a:extLst>
                 <a:ext uri="{FF2B5EF4-FFF2-40B4-BE49-F238E27FC236}">
-                  <a16:creationId xmlns="" xmlns:a16="http://schemas.microsoft.com/office/drawing/2014/main" id="{6334E37E-50AD-4FF8-AEBD-693F802D928C}"/>
+                  <a16:creationId xmlns:a16="http://schemas.microsoft.com/office/drawing/2014/main" xmlns="" id="{6334E37E-50AD-4FF8-AEBD-693F802D928C}"/>
                 </a:ext>
               </a:extLst>
             </p:cNvPr>
@@ -17684,7 +17684,7 @@
                 <p:cNvPr id="15" name="CuadroTexto 8">
                   <a:extLst>
                     <a:ext uri="{FF2B5EF4-FFF2-40B4-BE49-F238E27FC236}">
-                      <a16:creationId xmlns="" xmlns:a16="http://schemas.microsoft.com/office/drawing/2014/main" id="{234F421C-51D5-462F-A54B-F19E6A1A00B6}"/>
+                      <a16:creationId xmlns:a16="http://schemas.microsoft.com/office/drawing/2014/main" xmlns="" id="{234F421C-51D5-462F-A54B-F19E6A1A00B6}"/>
                     </a:ext>
                   </a:extLst>
                 </p:cNvPr>
@@ -17815,7 +17815,7 @@
             <p:cNvPr id="16" name="Flecha: a la derecha 9">
               <a:extLst>
                 <a:ext uri="{FF2B5EF4-FFF2-40B4-BE49-F238E27FC236}">
-                  <a16:creationId xmlns="" xmlns:a16="http://schemas.microsoft.com/office/drawing/2014/main" id="{AAB43AFC-8E2A-4A08-86A2-447D16944DD3}"/>
+                  <a16:creationId xmlns:a16="http://schemas.microsoft.com/office/drawing/2014/main" xmlns="" id="{AAB43AFC-8E2A-4A08-86A2-447D16944DD3}"/>
                 </a:ext>
               </a:extLst>
             </p:cNvPr>
@@ -17863,7 +17863,7 @@
                 <p:cNvPr id="17" name="CuadroTexto 10">
                   <a:extLst>
                     <a:ext uri="{FF2B5EF4-FFF2-40B4-BE49-F238E27FC236}">
-                      <a16:creationId xmlns="" xmlns:a16="http://schemas.microsoft.com/office/drawing/2014/main" id="{39586EE8-6621-4696-B92A-A8153A940BB3}"/>
+                      <a16:creationId xmlns:a16="http://schemas.microsoft.com/office/drawing/2014/main" xmlns="" id="{39586EE8-6621-4696-B92A-A8153A940BB3}"/>
                     </a:ext>
                   </a:extLst>
                 </p:cNvPr>
@@ -17994,7 +17994,7 @@
             <p:cNvPr id="18" name="Flecha: doblada 11">
               <a:extLst>
                 <a:ext uri="{FF2B5EF4-FFF2-40B4-BE49-F238E27FC236}">
-                  <a16:creationId xmlns="" xmlns:a16="http://schemas.microsoft.com/office/drawing/2014/main" id="{E29485EC-D777-44B5-AC6E-69B26B9D7666}"/>
+                  <a16:creationId xmlns:a16="http://schemas.microsoft.com/office/drawing/2014/main" xmlns="" id="{E29485EC-D777-44B5-AC6E-69B26B9D7666}"/>
                 </a:ext>
               </a:extLst>
             </p:cNvPr>
@@ -18044,7 +18044,7 @@
             <p:cNvPr id="19" name="Flecha: doblada 12">
               <a:extLst>
                 <a:ext uri="{FF2B5EF4-FFF2-40B4-BE49-F238E27FC236}">
-                  <a16:creationId xmlns="" xmlns:a16="http://schemas.microsoft.com/office/drawing/2014/main" id="{CA0EDDD0-6F85-4E31-AB18-EECE81F3E76F}"/>
+                  <a16:creationId xmlns:a16="http://schemas.microsoft.com/office/drawing/2014/main" xmlns="" id="{CA0EDDD0-6F85-4E31-AB18-EECE81F3E76F}"/>
                 </a:ext>
               </a:extLst>
             </p:cNvPr>
@@ -18094,7 +18094,7 @@
             <p:cNvPr id="20" name="Flecha: a la izquierda y derecha 13">
               <a:extLst>
                 <a:ext uri="{FF2B5EF4-FFF2-40B4-BE49-F238E27FC236}">
-                  <a16:creationId xmlns="" xmlns:a16="http://schemas.microsoft.com/office/drawing/2014/main" id="{EF39D1FC-1005-49CB-AA0B-1BC10AAD0AF6}"/>
+                  <a16:creationId xmlns:a16="http://schemas.microsoft.com/office/drawing/2014/main" xmlns="" id="{EF39D1FC-1005-49CB-AA0B-1BC10AAD0AF6}"/>
                 </a:ext>
               </a:extLst>
             </p:cNvPr>
@@ -18140,7 +18140,7 @@
             <p:cNvPr id="21" name="Conector recto de flecha 14">
               <a:extLst>
                 <a:ext uri="{FF2B5EF4-FFF2-40B4-BE49-F238E27FC236}">
-                  <a16:creationId xmlns="" xmlns:a16="http://schemas.microsoft.com/office/drawing/2014/main" id="{A4831EB4-A080-4AC1-B320-79306492CAA3}"/>
+                  <a16:creationId xmlns:a16="http://schemas.microsoft.com/office/drawing/2014/main" xmlns="" id="{A4831EB4-A080-4AC1-B320-79306492CAA3}"/>
                 </a:ext>
               </a:extLst>
             </p:cNvPr>
@@ -18187,7 +18187,7 @@
             <p:cNvPr id="22" name="Conector recto de flecha 15">
               <a:extLst>
                 <a:ext uri="{FF2B5EF4-FFF2-40B4-BE49-F238E27FC236}">
-                  <a16:creationId xmlns="" xmlns:a16="http://schemas.microsoft.com/office/drawing/2014/main" id="{EB109B4C-0584-4560-92B5-49DC9B1EFE8B}"/>
+                  <a16:creationId xmlns:a16="http://schemas.microsoft.com/office/drawing/2014/main" xmlns="" id="{EB109B4C-0584-4560-92B5-49DC9B1EFE8B}"/>
                 </a:ext>
               </a:extLst>
             </p:cNvPr>
@@ -18233,7 +18233,7 @@
                 <p:cNvPr id="23" name="CuadroTexto 16">
                   <a:extLst>
                     <a:ext uri="{FF2B5EF4-FFF2-40B4-BE49-F238E27FC236}">
-                      <a16:creationId xmlns="" xmlns:a16="http://schemas.microsoft.com/office/drawing/2014/main" id="{E8481E37-2E08-4F49-8B52-3D2F863D048F}"/>
+                      <a16:creationId xmlns:a16="http://schemas.microsoft.com/office/drawing/2014/main" xmlns="" id="{E8481E37-2E08-4F49-8B52-3D2F863D048F}"/>
                     </a:ext>
                   </a:extLst>
                 </p:cNvPr>
@@ -18357,7 +18357,7 @@
                 <p:cNvPr id="24" name="CuadroTexto 17">
                   <a:extLst>
                     <a:ext uri="{FF2B5EF4-FFF2-40B4-BE49-F238E27FC236}">
-                      <a16:creationId xmlns="" xmlns:a16="http://schemas.microsoft.com/office/drawing/2014/main" id="{BB74C01E-66EC-43FC-9205-8803DEDB111E}"/>
+                      <a16:creationId xmlns:a16="http://schemas.microsoft.com/office/drawing/2014/main" xmlns="" id="{BB74C01E-66EC-43FC-9205-8803DEDB111E}"/>
                     </a:ext>
                   </a:extLst>
                 </p:cNvPr>
@@ -18488,7 +18488,7 @@
             <p:cNvPr id="25" name="Conector recto de flecha 18">
               <a:extLst>
                 <a:ext uri="{FF2B5EF4-FFF2-40B4-BE49-F238E27FC236}">
-                  <a16:creationId xmlns="" xmlns:a16="http://schemas.microsoft.com/office/drawing/2014/main" id="{6C9FB43E-9BD3-4723-8F42-1DBE33E2613D}"/>
+                  <a16:creationId xmlns:a16="http://schemas.microsoft.com/office/drawing/2014/main" xmlns="" id="{6C9FB43E-9BD3-4723-8F42-1DBE33E2613D}"/>
                 </a:ext>
               </a:extLst>
             </p:cNvPr>
@@ -18534,7 +18534,7 @@
                 <p:cNvPr id="26" name="CuadroTexto 19">
                   <a:extLst>
                     <a:ext uri="{FF2B5EF4-FFF2-40B4-BE49-F238E27FC236}">
-                      <a16:creationId xmlns="" xmlns:a16="http://schemas.microsoft.com/office/drawing/2014/main" id="{049B585E-5028-47B5-8C93-62C275B4F2AE}"/>
+                      <a16:creationId xmlns:a16="http://schemas.microsoft.com/office/drawing/2014/main" xmlns="" id="{049B585E-5028-47B5-8C93-62C275B4F2AE}"/>
                     </a:ext>
                   </a:extLst>
                 </p:cNvPr>
@@ -18675,7 +18675,7 @@
             <p:cNvPr id="27" name="Conector recto de flecha 20">
               <a:extLst>
                 <a:ext uri="{FF2B5EF4-FFF2-40B4-BE49-F238E27FC236}">
-                  <a16:creationId xmlns="" xmlns:a16="http://schemas.microsoft.com/office/drawing/2014/main" id="{7D02A4EF-E087-45DE-A261-7459E0AE434D}"/>
+                  <a16:creationId xmlns:a16="http://schemas.microsoft.com/office/drawing/2014/main" xmlns="" id="{7D02A4EF-E087-45DE-A261-7459E0AE434D}"/>
                 </a:ext>
               </a:extLst>
             </p:cNvPr>
@@ -18721,7 +18721,7 @@
                 <p:cNvPr id="28" name="CuadroTexto 21">
                   <a:extLst>
                     <a:ext uri="{FF2B5EF4-FFF2-40B4-BE49-F238E27FC236}">
-                      <a16:creationId xmlns="" xmlns:a16="http://schemas.microsoft.com/office/drawing/2014/main" id="{01831FDA-251D-4CBA-9C3D-D140FD5409F8}"/>
+                      <a16:creationId xmlns:a16="http://schemas.microsoft.com/office/drawing/2014/main" xmlns="" id="{01831FDA-251D-4CBA-9C3D-D140FD5409F8}"/>
                     </a:ext>
                   </a:extLst>
                 </p:cNvPr>
@@ -18863,7 +18863,7 @@
             <p:cNvPr id="29" name="Picture 2" descr="Resultado de imagen para valvulas industriales">
               <a:extLst>
                 <a:ext uri="{FF2B5EF4-FFF2-40B4-BE49-F238E27FC236}">
-                  <a16:creationId xmlns="" xmlns:a16="http://schemas.microsoft.com/office/drawing/2014/main" id="{954A9FE0-B236-468A-B860-B9989853F14D}"/>
+                  <a16:creationId xmlns:a16="http://schemas.microsoft.com/office/drawing/2014/main" xmlns="" id="{954A9FE0-B236-468A-B860-B9989853F14D}"/>
                 </a:ext>
               </a:extLst>
             </p:cNvPr>
@@ -18908,7 +18908,7 @@
             <p:cNvPr id="30" name="Picture 2" descr="Resultado de imagen para valvulas industriales">
               <a:extLst>
                 <a:ext uri="{FF2B5EF4-FFF2-40B4-BE49-F238E27FC236}">
-                  <a16:creationId xmlns="" xmlns:a16="http://schemas.microsoft.com/office/drawing/2014/main" id="{BD0A98A4-E046-436C-8478-D0FE7C0DF220}"/>
+                  <a16:creationId xmlns:a16="http://schemas.microsoft.com/office/drawing/2014/main" xmlns="" id="{BD0A98A4-E046-436C-8478-D0FE7C0DF220}"/>
                 </a:ext>
               </a:extLst>
             </p:cNvPr>
@@ -22423,7 +22423,7 @@
           <p:nvPr>
             <p:extLst>
               <p:ext uri="{D42A27DB-BD31-4B8C-83A1-F6EECF244321}">
-                <p14:modId xmlns:p14="http://schemas.microsoft.com/office/powerpoint/2010/main" val="368684739"/>
+                <p14:modId xmlns:p14="http://schemas.microsoft.com/office/powerpoint/2010/main" val="2936289983"/>
               </p:ext>
             </p:extLst>
           </p:nvPr>
@@ -22650,7 +22650,11 @@
                     <a:p>
                       <a:pPr algn="just"/>
                       <a:r>
-                        <a:rPr lang="es-VE" sz="1700" dirty="0" smtClean="0"/>
+                        <a:rPr lang="es-VE" sz="1700" dirty="0" smtClean="0">
+                          <a:solidFill>
+                            <a:srgbClr val="FF0000"/>
+                          </a:solidFill>
+                        </a:rPr>
                         <a:t>Resalto hidráulico ideal para mezclado.</a:t>
                       </a:r>
                     </a:p>
@@ -22825,11 +22829,19 @@
                     <a:p>
                       <a:pPr algn="just"/>
                       <a:r>
-                        <a:rPr lang="es-VE" sz="1700" dirty="0" smtClean="0"/>
+                        <a:rPr lang="es-VE" sz="1700" dirty="0" smtClean="0">
+                          <a:solidFill>
+                            <a:srgbClr val="FF0000"/>
+                          </a:solidFill>
+                        </a:rPr>
                         <a:t>Falla en el</a:t>
                       </a:r>
                       <a:r>
-                        <a:rPr lang="es-VE" sz="1700" baseline="0" dirty="0" smtClean="0"/>
+                        <a:rPr lang="es-VE" sz="1700" baseline="0" dirty="0" smtClean="0">
+                          <a:solidFill>
+                            <a:srgbClr val="FF0000"/>
+                          </a:solidFill>
+                        </a:rPr>
                         <a:t> cálculo del resalto hidráulico.</a:t>
                       </a:r>
                     </a:p>

</xml_diff>